<commit_message>
Updated presentation ppt and altered analysis file for q1
</commit_message>
<xml_diff>
--- a/Project 1 Presentation.pptx
+++ b/Project 1 Presentation.pptx
@@ -14,6 +14,11 @@
     <p:sldId id="258" r:id="rId8"/>
     <p:sldId id="259" r:id="rId9"/>
     <p:sldId id="260" r:id="rId10"/>
+    <p:sldId id="266" r:id="rId11"/>
+    <p:sldId id="267" r:id="rId12"/>
+    <p:sldId id="268" r:id="rId13"/>
+    <p:sldId id="269" r:id="rId14"/>
+    <p:sldId id="270" r:id="rId15"/>
   </p:sldIdLst>
   <p:sldSz cx="12192000" cy="6858000"/>
   <p:notesSz cx="6858000" cy="9144000"/>
@@ -269,7 +274,7 @@
           <a:p>
             <a:fld id="{7AA4B683-9643-448A-92E1-C6392E401B19}" type="datetimeFigureOut">
               <a:rPr lang="en-GB" smtClean="0"/>
-              <a:t>30/11/2023</a:t>
+              <a:t>01/12/2023</a:t>
             </a:fld>
             <a:endParaRPr lang="en-GB"/>
           </a:p>
@@ -469,7 +474,7 @@
           <a:p>
             <a:fld id="{7AA4B683-9643-448A-92E1-C6392E401B19}" type="datetimeFigureOut">
               <a:rPr lang="en-GB" smtClean="0"/>
-              <a:t>30/11/2023</a:t>
+              <a:t>01/12/2023</a:t>
             </a:fld>
             <a:endParaRPr lang="en-GB"/>
           </a:p>
@@ -679,7 +684,7 @@
           <a:p>
             <a:fld id="{7AA4B683-9643-448A-92E1-C6392E401B19}" type="datetimeFigureOut">
               <a:rPr lang="en-GB" smtClean="0"/>
-              <a:t>30/11/2023</a:t>
+              <a:t>01/12/2023</a:t>
             </a:fld>
             <a:endParaRPr lang="en-GB"/>
           </a:p>
@@ -879,7 +884,7 @@
           <a:p>
             <a:fld id="{7AA4B683-9643-448A-92E1-C6392E401B19}" type="datetimeFigureOut">
               <a:rPr lang="en-GB" smtClean="0"/>
-              <a:t>30/11/2023</a:t>
+              <a:t>01/12/2023</a:t>
             </a:fld>
             <a:endParaRPr lang="en-GB"/>
           </a:p>
@@ -1155,7 +1160,7 @@
           <a:p>
             <a:fld id="{7AA4B683-9643-448A-92E1-C6392E401B19}" type="datetimeFigureOut">
               <a:rPr lang="en-GB" smtClean="0"/>
-              <a:t>30/11/2023</a:t>
+              <a:t>01/12/2023</a:t>
             </a:fld>
             <a:endParaRPr lang="en-GB"/>
           </a:p>
@@ -1423,7 +1428,7 @@
           <a:p>
             <a:fld id="{7AA4B683-9643-448A-92E1-C6392E401B19}" type="datetimeFigureOut">
               <a:rPr lang="en-GB" smtClean="0"/>
-              <a:t>30/11/2023</a:t>
+              <a:t>01/12/2023</a:t>
             </a:fld>
             <a:endParaRPr lang="en-GB"/>
           </a:p>
@@ -1838,7 +1843,7 @@
           <a:p>
             <a:fld id="{7AA4B683-9643-448A-92E1-C6392E401B19}" type="datetimeFigureOut">
               <a:rPr lang="en-GB" smtClean="0"/>
-              <a:t>30/11/2023</a:t>
+              <a:t>01/12/2023</a:t>
             </a:fld>
             <a:endParaRPr lang="en-GB"/>
           </a:p>
@@ -1980,7 +1985,7 @@
           <a:p>
             <a:fld id="{7AA4B683-9643-448A-92E1-C6392E401B19}" type="datetimeFigureOut">
               <a:rPr lang="en-GB" smtClean="0"/>
-              <a:t>30/11/2023</a:t>
+              <a:t>01/12/2023</a:t>
             </a:fld>
             <a:endParaRPr lang="en-GB"/>
           </a:p>
@@ -2093,7 +2098,7 @@
           <a:p>
             <a:fld id="{7AA4B683-9643-448A-92E1-C6392E401B19}" type="datetimeFigureOut">
               <a:rPr lang="en-GB" smtClean="0"/>
-              <a:t>30/11/2023</a:t>
+              <a:t>01/12/2023</a:t>
             </a:fld>
             <a:endParaRPr lang="en-GB"/>
           </a:p>
@@ -2406,7 +2411,7 @@
           <a:p>
             <a:fld id="{7AA4B683-9643-448A-92E1-C6392E401B19}" type="datetimeFigureOut">
               <a:rPr lang="en-GB" smtClean="0"/>
-              <a:t>30/11/2023</a:t>
+              <a:t>01/12/2023</a:t>
             </a:fld>
             <a:endParaRPr lang="en-GB"/>
           </a:p>
@@ -2695,7 +2700,7 @@
           <a:p>
             <a:fld id="{7AA4B683-9643-448A-92E1-C6392E401B19}" type="datetimeFigureOut">
               <a:rPr lang="en-GB" smtClean="0"/>
-              <a:t>30/11/2023</a:t>
+              <a:t>01/12/2023</a:t>
             </a:fld>
             <a:endParaRPr lang="en-GB"/>
           </a:p>
@@ -2944,7 +2949,7 @@
           <a:p>
             <a:fld id="{7AA4B683-9643-448A-92E1-C6392E401B19}" type="datetimeFigureOut">
               <a:rPr lang="en-GB" smtClean="0"/>
-              <a:t>30/11/2023</a:t>
+              <a:t>01/12/2023</a:t>
             </a:fld>
             <a:endParaRPr lang="en-GB"/>
           </a:p>
@@ -3404,6 +3409,952 @@
 </p:sld>
 </file>
 
+<file path=ppt/slides/slide10.xml><?xml version="1.0" encoding="utf-8"?>
+<p:sld xmlns:a="http://schemas.openxmlformats.org/drawingml/2006/main" xmlns:r="http://schemas.openxmlformats.org/officeDocument/2006/relationships" xmlns:p="http://schemas.openxmlformats.org/presentationml/2006/main">
+  <p:cSld>
+    <p:spTree>
+      <p:nvGrpSpPr>
+        <p:cNvPr id="1" name=""/>
+        <p:cNvGrpSpPr/>
+        <p:nvPr/>
+      </p:nvGrpSpPr>
+      <p:grpSpPr>
+        <a:xfrm>
+          <a:off x="0" y="0"/>
+          <a:ext cx="0" cy="0"/>
+          <a:chOff x="0" y="0"/>
+          <a:chExt cx="0" cy="0"/>
+        </a:xfrm>
+      </p:grpSpPr>
+      <p:sp>
+        <p:nvSpPr>
+          <p:cNvPr id="2" name="Title 1">
+            <a:extLst>
+              <a:ext uri="{FF2B5EF4-FFF2-40B4-BE49-F238E27FC236}">
+                <a16:creationId xmlns:a16="http://schemas.microsoft.com/office/drawing/2014/main" id="{44F0457C-EE58-0F09-2A26-FF2A2A5D7A6C}"/>
+              </a:ext>
+            </a:extLst>
+          </p:cNvPr>
+          <p:cNvSpPr>
+            <a:spLocks noGrp="1"/>
+          </p:cNvSpPr>
+          <p:nvPr>
+            <p:ph type="title"/>
+          </p:nvPr>
+        </p:nvSpPr>
+        <p:spPr>
+          <a:xfrm>
+            <a:off x="838199" y="111889"/>
+            <a:ext cx="10515600" cy="567748"/>
+          </a:xfrm>
+        </p:spPr>
+        <p:txBody>
+          <a:bodyPr>
+            <a:normAutofit fontScale="90000"/>
+          </a:bodyPr>
+          <a:lstStyle/>
+          <a:p>
+            <a:pPr algn="ctr"/>
+            <a:r>
+              <a:rPr lang="en-GB" dirty="0">
+                <a:solidFill>
+                  <a:schemeClr val="bg1"/>
+                </a:solidFill>
+              </a:rPr>
+              <a:t>Gender Analysis</a:t>
+            </a:r>
+          </a:p>
+        </p:txBody>
+      </p:sp>
+      <p:pic>
+        <p:nvPicPr>
+          <p:cNvPr id="33" name="Picture 32">
+            <a:extLst>
+              <a:ext uri="{FF2B5EF4-FFF2-40B4-BE49-F238E27FC236}">
+                <a16:creationId xmlns:a16="http://schemas.microsoft.com/office/drawing/2014/main" id="{AE7E180D-E018-D887-1FEE-A62561F1E414}"/>
+              </a:ext>
+            </a:extLst>
+          </p:cNvPr>
+          <p:cNvPicPr>
+            <a:picLocks noChangeAspect="1"/>
+          </p:cNvPicPr>
+          <p:nvPr/>
+        </p:nvPicPr>
+        <p:blipFill>
+          <a:blip r:embed="rId2">
+            <a:extLst>
+              <a:ext uri="{28A0092B-C50C-407E-A947-70E740481C1C}">
+                <a14:useLocalDpi xmlns:a14="http://schemas.microsoft.com/office/drawing/2010/main" val="0"/>
+              </a:ext>
+            </a:extLst>
+          </a:blip>
+          <a:stretch>
+            <a:fillRect/>
+          </a:stretch>
+        </p:blipFill>
+        <p:spPr>
+          <a:xfrm>
+            <a:off x="202129" y="757382"/>
+            <a:ext cx="5893871" cy="2936522"/>
+          </a:xfrm>
+          <a:prstGeom prst="rect">
+            <a:avLst/>
+          </a:prstGeom>
+        </p:spPr>
+      </p:pic>
+      <p:pic>
+        <p:nvPicPr>
+          <p:cNvPr id="35" name="Picture 34">
+            <a:extLst>
+              <a:ext uri="{FF2B5EF4-FFF2-40B4-BE49-F238E27FC236}">
+                <a16:creationId xmlns:a16="http://schemas.microsoft.com/office/drawing/2014/main" id="{F434FFC7-88BA-DFCA-7274-D6E130DC0BFA}"/>
+              </a:ext>
+            </a:extLst>
+          </p:cNvPr>
+          <p:cNvPicPr>
+            <a:picLocks noChangeAspect="1"/>
+          </p:cNvPicPr>
+          <p:nvPr/>
+        </p:nvPicPr>
+        <p:blipFill>
+          <a:blip r:embed="rId3">
+            <a:extLst>
+              <a:ext uri="{28A0092B-C50C-407E-A947-70E740481C1C}">
+                <a14:useLocalDpi xmlns:a14="http://schemas.microsoft.com/office/drawing/2010/main" val="0"/>
+              </a:ext>
+            </a:extLst>
+          </a:blip>
+          <a:stretch>
+            <a:fillRect/>
+          </a:stretch>
+        </p:blipFill>
+        <p:spPr>
+          <a:xfrm>
+            <a:off x="202128" y="3775291"/>
+            <a:ext cx="5893871" cy="2893075"/>
+          </a:xfrm>
+          <a:prstGeom prst="rect">
+            <a:avLst/>
+          </a:prstGeom>
+        </p:spPr>
+      </p:pic>
+      <p:pic>
+        <p:nvPicPr>
+          <p:cNvPr id="37" name="Picture 36">
+            <a:extLst>
+              <a:ext uri="{FF2B5EF4-FFF2-40B4-BE49-F238E27FC236}">
+                <a16:creationId xmlns:a16="http://schemas.microsoft.com/office/drawing/2014/main" id="{AE726E76-04D4-14ED-1716-A1D5F4123758}"/>
+              </a:ext>
+            </a:extLst>
+          </p:cNvPr>
+          <p:cNvPicPr>
+            <a:picLocks noChangeAspect="1"/>
+          </p:cNvPicPr>
+          <p:nvPr/>
+        </p:nvPicPr>
+        <p:blipFill>
+          <a:blip r:embed="rId4">
+            <a:extLst>
+              <a:ext uri="{28A0092B-C50C-407E-A947-70E740481C1C}">
+                <a14:useLocalDpi xmlns:a14="http://schemas.microsoft.com/office/drawing/2010/main" val="0"/>
+              </a:ext>
+            </a:extLst>
+          </a:blip>
+          <a:stretch>
+            <a:fillRect/>
+          </a:stretch>
+        </p:blipFill>
+        <p:spPr>
+          <a:xfrm>
+            <a:off x="6234534" y="757382"/>
+            <a:ext cx="5828156" cy="2914078"/>
+          </a:xfrm>
+          <a:prstGeom prst="rect">
+            <a:avLst/>
+          </a:prstGeom>
+        </p:spPr>
+      </p:pic>
+      <p:pic>
+        <p:nvPicPr>
+          <p:cNvPr id="39" name="Picture 38">
+            <a:extLst>
+              <a:ext uri="{FF2B5EF4-FFF2-40B4-BE49-F238E27FC236}">
+                <a16:creationId xmlns:a16="http://schemas.microsoft.com/office/drawing/2014/main" id="{A2633629-FB50-E24B-2F43-286BD8A2991C}"/>
+              </a:ext>
+            </a:extLst>
+          </p:cNvPr>
+          <p:cNvPicPr>
+            <a:picLocks noChangeAspect="1"/>
+          </p:cNvPicPr>
+          <p:nvPr/>
+        </p:nvPicPr>
+        <p:blipFill>
+          <a:blip r:embed="rId5">
+            <a:extLst>
+              <a:ext uri="{28A0092B-C50C-407E-A947-70E740481C1C}">
+                <a14:useLocalDpi xmlns:a14="http://schemas.microsoft.com/office/drawing/2010/main" val="0"/>
+              </a:ext>
+            </a:extLst>
+          </a:blip>
+          <a:stretch>
+            <a:fillRect/>
+          </a:stretch>
+        </p:blipFill>
+        <p:spPr>
+          <a:xfrm>
+            <a:off x="6234534" y="3764789"/>
+            <a:ext cx="5828156" cy="2914078"/>
+          </a:xfrm>
+          <a:prstGeom prst="rect">
+            <a:avLst/>
+          </a:prstGeom>
+        </p:spPr>
+      </p:pic>
+    </p:spTree>
+    <p:extLst>
+      <p:ext uri="{BB962C8B-B14F-4D97-AF65-F5344CB8AC3E}">
+        <p14:creationId xmlns:p14="http://schemas.microsoft.com/office/powerpoint/2010/main" val="2249510000"/>
+      </p:ext>
+    </p:extLst>
+  </p:cSld>
+  <p:clrMapOvr>
+    <a:masterClrMapping/>
+  </p:clrMapOvr>
+</p:sld>
+</file>
+
+<file path=ppt/slides/slide11.xml><?xml version="1.0" encoding="utf-8"?>
+<p:sld xmlns:a="http://schemas.openxmlformats.org/drawingml/2006/main" xmlns:r="http://schemas.openxmlformats.org/officeDocument/2006/relationships" xmlns:p="http://schemas.openxmlformats.org/presentationml/2006/main">
+  <p:cSld>
+    <p:spTree>
+      <p:nvGrpSpPr>
+        <p:cNvPr id="1" name=""/>
+        <p:cNvGrpSpPr/>
+        <p:nvPr/>
+      </p:nvGrpSpPr>
+      <p:grpSpPr>
+        <a:xfrm>
+          <a:off x="0" y="0"/>
+          <a:ext cx="0" cy="0"/>
+          <a:chOff x="0" y="0"/>
+          <a:chExt cx="0" cy="0"/>
+        </a:xfrm>
+      </p:grpSpPr>
+      <p:sp>
+        <p:nvSpPr>
+          <p:cNvPr id="4" name="Title 1">
+            <a:extLst>
+              <a:ext uri="{FF2B5EF4-FFF2-40B4-BE49-F238E27FC236}">
+                <a16:creationId xmlns:a16="http://schemas.microsoft.com/office/drawing/2014/main" id="{0DB61D62-072D-8DC8-1A1F-A669A9067998}"/>
+              </a:ext>
+            </a:extLst>
+          </p:cNvPr>
+          <p:cNvSpPr>
+            <a:spLocks noGrp="1"/>
+          </p:cNvSpPr>
+          <p:nvPr>
+            <p:ph type="title"/>
+          </p:nvPr>
+        </p:nvSpPr>
+        <p:spPr>
+          <a:xfrm>
+            <a:off x="838200" y="189634"/>
+            <a:ext cx="10515600" cy="567748"/>
+          </a:xfrm>
+        </p:spPr>
+        <p:txBody>
+          <a:bodyPr>
+            <a:normAutofit fontScale="90000"/>
+          </a:bodyPr>
+          <a:lstStyle/>
+          <a:p>
+            <a:pPr algn="ctr"/>
+            <a:r>
+              <a:rPr lang="en-GB" dirty="0">
+                <a:solidFill>
+                  <a:schemeClr val="bg1"/>
+                </a:solidFill>
+              </a:rPr>
+              <a:t>Ethnicity Analysis</a:t>
+            </a:r>
+          </a:p>
+        </p:txBody>
+      </p:sp>
+      <p:pic>
+        <p:nvPicPr>
+          <p:cNvPr id="22" name="Picture 21">
+            <a:extLst>
+              <a:ext uri="{FF2B5EF4-FFF2-40B4-BE49-F238E27FC236}">
+                <a16:creationId xmlns:a16="http://schemas.microsoft.com/office/drawing/2014/main" id="{1060494F-1178-1942-0BD0-AE1E8604BE78}"/>
+              </a:ext>
+            </a:extLst>
+          </p:cNvPr>
+          <p:cNvPicPr>
+            <a:picLocks noChangeAspect="1"/>
+          </p:cNvPicPr>
+          <p:nvPr/>
+        </p:nvPicPr>
+        <p:blipFill>
+          <a:blip r:embed="rId2">
+            <a:extLst>
+              <a:ext uri="{28A0092B-C50C-407E-A947-70E740481C1C}">
+                <a14:useLocalDpi xmlns:a14="http://schemas.microsoft.com/office/drawing/2010/main" val="0"/>
+              </a:ext>
+            </a:extLst>
+          </a:blip>
+          <a:stretch>
+            <a:fillRect/>
+          </a:stretch>
+        </p:blipFill>
+        <p:spPr>
+          <a:xfrm>
+            <a:off x="172710" y="757382"/>
+            <a:ext cx="5923290" cy="2930469"/>
+          </a:xfrm>
+          <a:prstGeom prst="rect">
+            <a:avLst/>
+          </a:prstGeom>
+        </p:spPr>
+      </p:pic>
+      <p:pic>
+        <p:nvPicPr>
+          <p:cNvPr id="24" name="Picture 23">
+            <a:extLst>
+              <a:ext uri="{FF2B5EF4-FFF2-40B4-BE49-F238E27FC236}">
+                <a16:creationId xmlns:a16="http://schemas.microsoft.com/office/drawing/2014/main" id="{8C5D67EF-B98A-C6E9-8871-DE6FD2C31DC1}"/>
+              </a:ext>
+            </a:extLst>
+          </p:cNvPr>
+          <p:cNvPicPr>
+            <a:picLocks noChangeAspect="1"/>
+          </p:cNvPicPr>
+          <p:nvPr/>
+        </p:nvPicPr>
+        <p:blipFill>
+          <a:blip r:embed="rId3">
+            <a:extLst>
+              <a:ext uri="{28A0092B-C50C-407E-A947-70E740481C1C}">
+                <a14:useLocalDpi xmlns:a14="http://schemas.microsoft.com/office/drawing/2010/main" val="0"/>
+              </a:ext>
+            </a:extLst>
+          </a:blip>
+          <a:stretch>
+            <a:fillRect/>
+          </a:stretch>
+        </p:blipFill>
+        <p:spPr>
+          <a:xfrm>
+            <a:off x="172710" y="3780954"/>
+            <a:ext cx="5923290" cy="2887412"/>
+          </a:xfrm>
+          <a:prstGeom prst="rect">
+            <a:avLst/>
+          </a:prstGeom>
+        </p:spPr>
+      </p:pic>
+      <p:pic>
+        <p:nvPicPr>
+          <p:cNvPr id="28" name="Picture 27">
+            <a:extLst>
+              <a:ext uri="{FF2B5EF4-FFF2-40B4-BE49-F238E27FC236}">
+                <a16:creationId xmlns:a16="http://schemas.microsoft.com/office/drawing/2014/main" id="{E3FCB9F2-5B1B-D77B-15EC-16D0D78DECEA}"/>
+              </a:ext>
+            </a:extLst>
+          </p:cNvPr>
+          <p:cNvPicPr>
+            <a:picLocks noChangeAspect="1"/>
+          </p:cNvPicPr>
+          <p:nvPr/>
+        </p:nvPicPr>
+        <p:blipFill>
+          <a:blip r:embed="rId4">
+            <a:extLst>
+              <a:ext uri="{28A0092B-C50C-407E-A947-70E740481C1C}">
+                <a14:useLocalDpi xmlns:a14="http://schemas.microsoft.com/office/drawing/2010/main" val="0"/>
+              </a:ext>
+            </a:extLst>
+          </a:blip>
+          <a:stretch>
+            <a:fillRect/>
+          </a:stretch>
+        </p:blipFill>
+        <p:spPr>
+          <a:xfrm>
+            <a:off x="6185583" y="3780954"/>
+            <a:ext cx="5923290" cy="2915127"/>
+          </a:xfrm>
+          <a:prstGeom prst="rect">
+            <a:avLst/>
+          </a:prstGeom>
+        </p:spPr>
+      </p:pic>
+      <p:pic>
+        <p:nvPicPr>
+          <p:cNvPr id="30" name="Picture 29">
+            <a:extLst>
+              <a:ext uri="{FF2B5EF4-FFF2-40B4-BE49-F238E27FC236}">
+                <a16:creationId xmlns:a16="http://schemas.microsoft.com/office/drawing/2014/main" id="{92D3A94E-CC02-3345-2BA8-3CE2AFFB2E58}"/>
+              </a:ext>
+            </a:extLst>
+          </p:cNvPr>
+          <p:cNvPicPr>
+            <a:picLocks noChangeAspect="1"/>
+          </p:cNvPicPr>
+          <p:nvPr/>
+        </p:nvPicPr>
+        <p:blipFill>
+          <a:blip r:embed="rId5">
+            <a:extLst>
+              <a:ext uri="{28A0092B-C50C-407E-A947-70E740481C1C}">
+                <a14:useLocalDpi xmlns:a14="http://schemas.microsoft.com/office/drawing/2010/main" val="0"/>
+              </a:ext>
+            </a:extLst>
+          </a:blip>
+          <a:stretch>
+            <a:fillRect/>
+          </a:stretch>
+        </p:blipFill>
+        <p:spPr>
+          <a:xfrm>
+            <a:off x="6185583" y="757381"/>
+            <a:ext cx="5923290" cy="2930470"/>
+          </a:xfrm>
+          <a:prstGeom prst="rect">
+            <a:avLst/>
+          </a:prstGeom>
+        </p:spPr>
+      </p:pic>
+    </p:spTree>
+    <p:extLst>
+      <p:ext uri="{BB962C8B-B14F-4D97-AF65-F5344CB8AC3E}">
+        <p14:creationId xmlns:p14="http://schemas.microsoft.com/office/powerpoint/2010/main" val="2628928529"/>
+      </p:ext>
+    </p:extLst>
+  </p:cSld>
+  <p:clrMapOvr>
+    <a:masterClrMapping/>
+  </p:clrMapOvr>
+</p:sld>
+</file>
+
+<file path=ppt/slides/slide12.xml><?xml version="1.0" encoding="utf-8"?>
+<p:sld xmlns:a="http://schemas.openxmlformats.org/drawingml/2006/main" xmlns:r="http://schemas.openxmlformats.org/officeDocument/2006/relationships" xmlns:p="http://schemas.openxmlformats.org/presentationml/2006/main">
+  <p:cSld>
+    <p:spTree>
+      <p:nvGrpSpPr>
+        <p:cNvPr id="1" name=""/>
+        <p:cNvGrpSpPr/>
+        <p:nvPr/>
+      </p:nvGrpSpPr>
+      <p:grpSpPr>
+        <a:xfrm>
+          <a:off x="0" y="0"/>
+          <a:ext cx="0" cy="0"/>
+          <a:chOff x="0" y="0"/>
+          <a:chExt cx="0" cy="0"/>
+        </a:xfrm>
+      </p:grpSpPr>
+      <p:sp>
+        <p:nvSpPr>
+          <p:cNvPr id="4" name="Title 1">
+            <a:extLst>
+              <a:ext uri="{FF2B5EF4-FFF2-40B4-BE49-F238E27FC236}">
+                <a16:creationId xmlns:a16="http://schemas.microsoft.com/office/drawing/2014/main" id="{3BFD02AD-F6B7-7447-7C4A-B6B5CDC5F7FE}"/>
+              </a:ext>
+            </a:extLst>
+          </p:cNvPr>
+          <p:cNvSpPr>
+            <a:spLocks noGrp="1"/>
+          </p:cNvSpPr>
+          <p:nvPr>
+            <p:ph type="title"/>
+          </p:nvPr>
+        </p:nvSpPr>
+        <p:spPr>
+          <a:xfrm>
+            <a:off x="838200" y="189634"/>
+            <a:ext cx="10515600" cy="567748"/>
+          </a:xfrm>
+        </p:spPr>
+        <p:txBody>
+          <a:bodyPr>
+            <a:normAutofit fontScale="90000"/>
+          </a:bodyPr>
+          <a:lstStyle/>
+          <a:p>
+            <a:pPr algn="ctr"/>
+            <a:r>
+              <a:rPr lang="en-GB" dirty="0">
+                <a:solidFill>
+                  <a:schemeClr val="bg1"/>
+                </a:solidFill>
+              </a:rPr>
+              <a:t>Social Class Analysis</a:t>
+            </a:r>
+          </a:p>
+        </p:txBody>
+      </p:sp>
+      <p:pic>
+        <p:nvPicPr>
+          <p:cNvPr id="20" name="Picture 19">
+            <a:extLst>
+              <a:ext uri="{FF2B5EF4-FFF2-40B4-BE49-F238E27FC236}">
+                <a16:creationId xmlns:a16="http://schemas.microsoft.com/office/drawing/2014/main" id="{F76CAF88-BF03-AFC3-2A3A-1F5A77FFA77F}"/>
+              </a:ext>
+            </a:extLst>
+          </p:cNvPr>
+          <p:cNvPicPr>
+            <a:picLocks noChangeAspect="1"/>
+          </p:cNvPicPr>
+          <p:nvPr/>
+        </p:nvPicPr>
+        <p:blipFill>
+          <a:blip r:embed="rId2">
+            <a:extLst>
+              <a:ext uri="{28A0092B-C50C-407E-A947-70E740481C1C}">
+                <a14:useLocalDpi xmlns:a14="http://schemas.microsoft.com/office/drawing/2010/main" val="0"/>
+              </a:ext>
+            </a:extLst>
+          </a:blip>
+          <a:stretch>
+            <a:fillRect/>
+          </a:stretch>
+        </p:blipFill>
+        <p:spPr>
+          <a:xfrm>
+            <a:off x="169431" y="853520"/>
+            <a:ext cx="5926569" cy="2859354"/>
+          </a:xfrm>
+          <a:prstGeom prst="rect">
+            <a:avLst/>
+          </a:prstGeom>
+        </p:spPr>
+      </p:pic>
+      <p:pic>
+        <p:nvPicPr>
+          <p:cNvPr id="24" name="Picture 23">
+            <a:extLst>
+              <a:ext uri="{FF2B5EF4-FFF2-40B4-BE49-F238E27FC236}">
+                <a16:creationId xmlns:a16="http://schemas.microsoft.com/office/drawing/2014/main" id="{E08381D5-F249-5060-1231-0A2AF84E46B5}"/>
+              </a:ext>
+            </a:extLst>
+          </p:cNvPr>
+          <p:cNvPicPr>
+            <a:picLocks noChangeAspect="1"/>
+          </p:cNvPicPr>
+          <p:nvPr/>
+        </p:nvPicPr>
+        <p:blipFill>
+          <a:blip r:embed="rId3">
+            <a:extLst>
+              <a:ext uri="{28A0092B-C50C-407E-A947-70E740481C1C}">
+                <a14:useLocalDpi xmlns:a14="http://schemas.microsoft.com/office/drawing/2010/main" val="0"/>
+              </a:ext>
+            </a:extLst>
+          </a:blip>
+          <a:stretch>
+            <a:fillRect/>
+          </a:stretch>
+        </p:blipFill>
+        <p:spPr>
+          <a:xfrm>
+            <a:off x="160933" y="3809012"/>
+            <a:ext cx="5926569" cy="2820747"/>
+          </a:xfrm>
+          <a:prstGeom prst="rect">
+            <a:avLst/>
+          </a:prstGeom>
+        </p:spPr>
+      </p:pic>
+      <p:pic>
+        <p:nvPicPr>
+          <p:cNvPr id="26" name="Picture 25">
+            <a:extLst>
+              <a:ext uri="{FF2B5EF4-FFF2-40B4-BE49-F238E27FC236}">
+                <a16:creationId xmlns:a16="http://schemas.microsoft.com/office/drawing/2014/main" id="{3F760A7F-75A1-12B1-9241-BBD056E4D6C1}"/>
+              </a:ext>
+            </a:extLst>
+          </p:cNvPr>
+          <p:cNvPicPr>
+            <a:picLocks noChangeAspect="1"/>
+          </p:cNvPicPr>
+          <p:nvPr/>
+        </p:nvPicPr>
+        <p:blipFill>
+          <a:blip r:embed="rId4">
+            <a:extLst>
+              <a:ext uri="{28A0092B-C50C-407E-A947-70E740481C1C}">
+                <a14:useLocalDpi xmlns:a14="http://schemas.microsoft.com/office/drawing/2010/main" val="0"/>
+              </a:ext>
+            </a:extLst>
+          </a:blip>
+          <a:stretch>
+            <a:fillRect/>
+          </a:stretch>
+        </p:blipFill>
+        <p:spPr>
+          <a:xfrm>
+            <a:off x="6250709" y="853520"/>
+            <a:ext cx="5682673" cy="2841337"/>
+          </a:xfrm>
+          <a:prstGeom prst="rect">
+            <a:avLst/>
+          </a:prstGeom>
+        </p:spPr>
+      </p:pic>
+      <p:pic>
+        <p:nvPicPr>
+          <p:cNvPr id="28" name="Picture 27">
+            <a:extLst>
+              <a:ext uri="{FF2B5EF4-FFF2-40B4-BE49-F238E27FC236}">
+                <a16:creationId xmlns:a16="http://schemas.microsoft.com/office/drawing/2014/main" id="{DF23A5E8-AB9E-71AD-0567-43B8F334495F}"/>
+              </a:ext>
+            </a:extLst>
+          </p:cNvPr>
+          <p:cNvPicPr>
+            <a:picLocks noChangeAspect="1"/>
+          </p:cNvPicPr>
+          <p:nvPr/>
+        </p:nvPicPr>
+        <p:blipFill>
+          <a:blip r:embed="rId5">
+            <a:extLst>
+              <a:ext uri="{28A0092B-C50C-407E-A947-70E740481C1C}">
+                <a14:useLocalDpi xmlns:a14="http://schemas.microsoft.com/office/drawing/2010/main" val="0"/>
+              </a:ext>
+            </a:extLst>
+          </a:blip>
+          <a:stretch>
+            <a:fillRect/>
+          </a:stretch>
+        </p:blipFill>
+        <p:spPr>
+          <a:xfrm>
+            <a:off x="6276815" y="3790085"/>
+            <a:ext cx="5682673" cy="2841337"/>
+          </a:xfrm>
+          <a:prstGeom prst="rect">
+            <a:avLst/>
+          </a:prstGeom>
+        </p:spPr>
+      </p:pic>
+    </p:spTree>
+    <p:extLst>
+      <p:ext uri="{BB962C8B-B14F-4D97-AF65-F5344CB8AC3E}">
+        <p14:creationId xmlns:p14="http://schemas.microsoft.com/office/powerpoint/2010/main" val="2368834337"/>
+      </p:ext>
+    </p:extLst>
+  </p:cSld>
+  <p:clrMapOvr>
+    <a:masterClrMapping/>
+  </p:clrMapOvr>
+</p:sld>
+</file>
+
+<file path=ppt/slides/slide13.xml><?xml version="1.0" encoding="utf-8"?>
+<p:sld xmlns:a="http://schemas.openxmlformats.org/drawingml/2006/main" xmlns:r="http://schemas.openxmlformats.org/officeDocument/2006/relationships" xmlns:p="http://schemas.openxmlformats.org/presentationml/2006/main">
+  <p:cSld>
+    <p:spTree>
+      <p:nvGrpSpPr>
+        <p:cNvPr id="1" name=""/>
+        <p:cNvGrpSpPr/>
+        <p:nvPr/>
+      </p:nvGrpSpPr>
+      <p:grpSpPr>
+        <a:xfrm>
+          <a:off x="0" y="0"/>
+          <a:ext cx="0" cy="0"/>
+          <a:chOff x="0" y="0"/>
+          <a:chExt cx="0" cy="0"/>
+        </a:xfrm>
+      </p:grpSpPr>
+      <p:sp>
+        <p:nvSpPr>
+          <p:cNvPr id="4" name="Title 1">
+            <a:extLst>
+              <a:ext uri="{FF2B5EF4-FFF2-40B4-BE49-F238E27FC236}">
+                <a16:creationId xmlns:a16="http://schemas.microsoft.com/office/drawing/2014/main" id="{14F892F5-91D3-0A78-1D2C-03E5D9973DB1}"/>
+              </a:ext>
+            </a:extLst>
+          </p:cNvPr>
+          <p:cNvSpPr>
+            <a:spLocks noGrp="1"/>
+          </p:cNvSpPr>
+          <p:nvPr>
+            <p:ph type="title"/>
+          </p:nvPr>
+        </p:nvSpPr>
+        <p:spPr>
+          <a:xfrm>
+            <a:off x="838200" y="189634"/>
+            <a:ext cx="10515600" cy="567748"/>
+          </a:xfrm>
+        </p:spPr>
+        <p:txBody>
+          <a:bodyPr>
+            <a:normAutofit fontScale="90000"/>
+          </a:bodyPr>
+          <a:lstStyle/>
+          <a:p>
+            <a:pPr algn="ctr"/>
+            <a:r>
+              <a:rPr lang="en-GB" dirty="0">
+                <a:solidFill>
+                  <a:schemeClr val="bg1"/>
+                </a:solidFill>
+              </a:rPr>
+              <a:t>Social Class and Ethnicity Analysis</a:t>
+            </a:r>
+          </a:p>
+        </p:txBody>
+      </p:sp>
+      <p:pic>
+        <p:nvPicPr>
+          <p:cNvPr id="6" name="Picture 5">
+            <a:extLst>
+              <a:ext uri="{FF2B5EF4-FFF2-40B4-BE49-F238E27FC236}">
+                <a16:creationId xmlns:a16="http://schemas.microsoft.com/office/drawing/2014/main" id="{DE5EE8C4-C5AC-ADAA-E47E-BEB2D0853588}"/>
+              </a:ext>
+            </a:extLst>
+          </p:cNvPr>
+          <p:cNvPicPr>
+            <a:picLocks noChangeAspect="1"/>
+          </p:cNvPicPr>
+          <p:nvPr/>
+        </p:nvPicPr>
+        <p:blipFill>
+          <a:blip r:embed="rId2">
+            <a:extLst>
+              <a:ext uri="{28A0092B-C50C-407E-A947-70E740481C1C}">
+                <a14:useLocalDpi xmlns:a14="http://schemas.microsoft.com/office/drawing/2010/main" val="0"/>
+              </a:ext>
+            </a:extLst>
+          </a:blip>
+          <a:stretch>
+            <a:fillRect/>
+          </a:stretch>
+        </p:blipFill>
+        <p:spPr>
+          <a:xfrm>
+            <a:off x="119598" y="757382"/>
+            <a:ext cx="5864317" cy="2885861"/>
+          </a:xfrm>
+          <a:prstGeom prst="rect">
+            <a:avLst/>
+          </a:prstGeom>
+        </p:spPr>
+      </p:pic>
+      <p:pic>
+        <p:nvPicPr>
+          <p:cNvPr id="8" name="Picture 7">
+            <a:extLst>
+              <a:ext uri="{FF2B5EF4-FFF2-40B4-BE49-F238E27FC236}">
+                <a16:creationId xmlns:a16="http://schemas.microsoft.com/office/drawing/2014/main" id="{D4877353-E89A-0FE6-3860-9153FE1D4B6B}"/>
+              </a:ext>
+            </a:extLst>
+          </p:cNvPr>
+          <p:cNvPicPr>
+            <a:picLocks noChangeAspect="1"/>
+          </p:cNvPicPr>
+          <p:nvPr/>
+        </p:nvPicPr>
+        <p:blipFill>
+          <a:blip r:embed="rId3">
+            <a:extLst>
+              <a:ext uri="{28A0092B-C50C-407E-A947-70E740481C1C}">
+                <a14:useLocalDpi xmlns:a14="http://schemas.microsoft.com/office/drawing/2010/main" val="0"/>
+              </a:ext>
+            </a:extLst>
+          </a:blip>
+          <a:stretch>
+            <a:fillRect/>
+          </a:stretch>
+        </p:blipFill>
+        <p:spPr>
+          <a:xfrm>
+            <a:off x="6208087" y="757382"/>
+            <a:ext cx="5864315" cy="2885860"/>
+          </a:xfrm>
+          <a:prstGeom prst="rect">
+            <a:avLst/>
+          </a:prstGeom>
+        </p:spPr>
+      </p:pic>
+      <p:pic>
+        <p:nvPicPr>
+          <p:cNvPr id="10" name="Picture 9">
+            <a:extLst>
+              <a:ext uri="{FF2B5EF4-FFF2-40B4-BE49-F238E27FC236}">
+                <a16:creationId xmlns:a16="http://schemas.microsoft.com/office/drawing/2014/main" id="{9638E65D-C40C-3DE8-8B72-712763AA1E99}"/>
+              </a:ext>
+            </a:extLst>
+          </p:cNvPr>
+          <p:cNvPicPr>
+            <a:picLocks noChangeAspect="1"/>
+          </p:cNvPicPr>
+          <p:nvPr/>
+        </p:nvPicPr>
+        <p:blipFill>
+          <a:blip r:embed="rId4">
+            <a:extLst>
+              <a:ext uri="{28A0092B-C50C-407E-A947-70E740481C1C}">
+                <a14:useLocalDpi xmlns:a14="http://schemas.microsoft.com/office/drawing/2010/main" val="0"/>
+              </a:ext>
+            </a:extLst>
+          </a:blip>
+          <a:stretch>
+            <a:fillRect/>
+          </a:stretch>
+        </p:blipFill>
+        <p:spPr>
+          <a:xfrm>
+            <a:off x="119598" y="3713018"/>
+            <a:ext cx="5864315" cy="2858664"/>
+          </a:xfrm>
+          <a:prstGeom prst="rect">
+            <a:avLst/>
+          </a:prstGeom>
+        </p:spPr>
+      </p:pic>
+      <p:pic>
+        <p:nvPicPr>
+          <p:cNvPr id="12" name="Picture 11">
+            <a:extLst>
+              <a:ext uri="{FF2B5EF4-FFF2-40B4-BE49-F238E27FC236}">
+                <a16:creationId xmlns:a16="http://schemas.microsoft.com/office/drawing/2014/main" id="{5C3D41A4-D46A-ABCA-9F19-C143DDFB61FC}"/>
+              </a:ext>
+            </a:extLst>
+          </p:cNvPr>
+          <p:cNvPicPr>
+            <a:picLocks noChangeAspect="1"/>
+          </p:cNvPicPr>
+          <p:nvPr/>
+        </p:nvPicPr>
+        <p:blipFill>
+          <a:blip r:embed="rId5">
+            <a:extLst>
+              <a:ext uri="{28A0092B-C50C-407E-A947-70E740481C1C}">
+                <a14:useLocalDpi xmlns:a14="http://schemas.microsoft.com/office/drawing/2010/main" val="0"/>
+              </a:ext>
+            </a:extLst>
+          </a:blip>
+          <a:stretch>
+            <a:fillRect/>
+          </a:stretch>
+        </p:blipFill>
+        <p:spPr>
+          <a:xfrm>
+            <a:off x="6208086" y="3713018"/>
+            <a:ext cx="5864316" cy="2858664"/>
+          </a:xfrm>
+          <a:prstGeom prst="rect">
+            <a:avLst/>
+          </a:prstGeom>
+        </p:spPr>
+      </p:pic>
+    </p:spTree>
+    <p:extLst>
+      <p:ext uri="{BB962C8B-B14F-4D97-AF65-F5344CB8AC3E}">
+        <p14:creationId xmlns:p14="http://schemas.microsoft.com/office/powerpoint/2010/main" val="3029821975"/>
+      </p:ext>
+    </p:extLst>
+  </p:cSld>
+  <p:clrMapOvr>
+    <a:masterClrMapping/>
+  </p:clrMapOvr>
+</p:sld>
+</file>
+
+<file path=ppt/slides/slide14.xml><?xml version="1.0" encoding="utf-8"?>
+<p:sld xmlns:a="http://schemas.openxmlformats.org/drawingml/2006/main" xmlns:r="http://schemas.openxmlformats.org/officeDocument/2006/relationships" xmlns:p="http://schemas.openxmlformats.org/presentationml/2006/main">
+  <p:cSld>
+    <p:spTree>
+      <p:nvGrpSpPr>
+        <p:cNvPr id="1" name=""/>
+        <p:cNvGrpSpPr/>
+        <p:nvPr/>
+      </p:nvGrpSpPr>
+      <p:grpSpPr>
+        <a:xfrm>
+          <a:off x="0" y="0"/>
+          <a:ext cx="0" cy="0"/>
+          <a:chOff x="0" y="0"/>
+          <a:chExt cx="0" cy="0"/>
+        </a:xfrm>
+      </p:grpSpPr>
+      <p:pic>
+        <p:nvPicPr>
+          <p:cNvPr id="7" name="Picture 6">
+            <a:extLst>
+              <a:ext uri="{FF2B5EF4-FFF2-40B4-BE49-F238E27FC236}">
+                <a16:creationId xmlns:a16="http://schemas.microsoft.com/office/drawing/2014/main" id="{3D66B059-F6A1-82A3-36D9-5BFF24FBC970}"/>
+              </a:ext>
+            </a:extLst>
+          </p:cNvPr>
+          <p:cNvPicPr>
+            <a:picLocks noChangeAspect="1"/>
+          </p:cNvPicPr>
+          <p:nvPr/>
+        </p:nvPicPr>
+        <p:blipFill>
+          <a:blip r:embed="rId2"/>
+          <a:stretch>
+            <a:fillRect/>
+          </a:stretch>
+        </p:blipFill>
+        <p:spPr>
+          <a:xfrm>
+            <a:off x="6331389" y="568895"/>
+            <a:ext cx="5629702" cy="5324706"/>
+          </a:xfrm>
+          <a:prstGeom prst="rect">
+            <a:avLst/>
+          </a:prstGeom>
+        </p:spPr>
+      </p:pic>
+      <p:pic>
+        <p:nvPicPr>
+          <p:cNvPr id="9" name="Picture 8">
+            <a:extLst>
+              <a:ext uri="{FF2B5EF4-FFF2-40B4-BE49-F238E27FC236}">
+                <a16:creationId xmlns:a16="http://schemas.microsoft.com/office/drawing/2014/main" id="{04014D65-C32E-8A44-1A66-1CB756F6FDB7}"/>
+              </a:ext>
+            </a:extLst>
+          </p:cNvPr>
+          <p:cNvPicPr>
+            <a:picLocks noChangeAspect="1"/>
+          </p:cNvPicPr>
+          <p:nvPr/>
+        </p:nvPicPr>
+        <p:blipFill>
+          <a:blip r:embed="rId3"/>
+          <a:stretch>
+            <a:fillRect/>
+          </a:stretch>
+        </p:blipFill>
+        <p:spPr>
+          <a:xfrm>
+            <a:off x="378844" y="568896"/>
+            <a:ext cx="5521682" cy="5324706"/>
+          </a:xfrm>
+          <a:prstGeom prst="rect">
+            <a:avLst/>
+          </a:prstGeom>
+        </p:spPr>
+      </p:pic>
+    </p:spTree>
+    <p:extLst>
+      <p:ext uri="{BB962C8B-B14F-4D97-AF65-F5344CB8AC3E}">
+        <p14:creationId xmlns:p14="http://schemas.microsoft.com/office/powerpoint/2010/main" val="2099335684"/>
+      </p:ext>
+    </p:extLst>
+  </p:cSld>
+  <p:clrMapOvr>
+    <a:masterClrMapping/>
+  </p:clrMapOvr>
+</p:sld>
+</file>
+
 <file path=ppt/slides/slide2.xml><?xml version="1.0" encoding="utf-8"?>
 <p:sld xmlns:a="http://schemas.openxmlformats.org/drawingml/2006/main" xmlns:r="http://schemas.openxmlformats.org/officeDocument/2006/relationships" xmlns:p="http://schemas.openxmlformats.org/presentationml/2006/main">
   <p:cSld>
@@ -4831,6 +5782,45 @@
           <a:p>
             <a:pPr algn="ctr"/>
             <a:endParaRPr lang="en-GB"/>
+          </a:p>
+        </p:txBody>
+      </p:sp>
+      <p:sp>
+        <p:nvSpPr>
+          <p:cNvPr id="2" name="TextBox 1">
+            <a:extLst>
+              <a:ext uri="{FF2B5EF4-FFF2-40B4-BE49-F238E27FC236}">
+                <a16:creationId xmlns:a16="http://schemas.microsoft.com/office/drawing/2014/main" id="{54172816-F9AB-CA93-9F24-133EF0B61110}"/>
+              </a:ext>
+            </a:extLst>
+          </p:cNvPr>
+          <p:cNvSpPr txBox="1"/>
+          <p:nvPr/>
+        </p:nvSpPr>
+        <p:spPr>
+          <a:xfrm>
+            <a:off x="6650182" y="898779"/>
+            <a:ext cx="3140363" cy="1077218"/>
+          </a:xfrm>
+          <a:prstGeom prst="rect">
+            <a:avLst/>
+          </a:prstGeom>
+          <a:noFill/>
+        </p:spPr>
+        <p:txBody>
+          <a:bodyPr wrap="square" rtlCol="0">
+            <a:spAutoFit/>
+          </a:bodyPr>
+          <a:lstStyle/>
+          <a:p>
+            <a:r>
+              <a:rPr lang="en-GB" sz="3200" dirty="0">
+                <a:solidFill>
+                  <a:schemeClr val="bg1"/>
+                </a:solidFill>
+              </a:rPr>
+              <a:t>GCSEs are graded from 1 to 9</a:t>
+            </a:r>
           </a:p>
         </p:txBody>
       </p:sp>

</xml_diff>

<commit_message>
Q1 stats analysis, renamed files and re-ordered data folders
</commit_message>
<xml_diff>
--- a/Project 1 Presentation.pptx
+++ b/Project 1 Presentation.pptx
@@ -14,11 +14,16 @@
     <p:sldId id="258" r:id="rId8"/>
     <p:sldId id="259" r:id="rId9"/>
     <p:sldId id="260" r:id="rId10"/>
-    <p:sldId id="266" r:id="rId11"/>
-    <p:sldId id="267" r:id="rId12"/>
-    <p:sldId id="268" r:id="rId13"/>
-    <p:sldId id="269" r:id="rId14"/>
-    <p:sldId id="270" r:id="rId15"/>
+    <p:sldId id="275" r:id="rId11"/>
+    <p:sldId id="266" r:id="rId12"/>
+    <p:sldId id="267" r:id="rId13"/>
+    <p:sldId id="268" r:id="rId14"/>
+    <p:sldId id="269" r:id="rId15"/>
+    <p:sldId id="273" r:id="rId16"/>
+    <p:sldId id="271" r:id="rId17"/>
+    <p:sldId id="274" r:id="rId18"/>
+    <p:sldId id="272" r:id="rId19"/>
+    <p:sldId id="270" r:id="rId20"/>
   </p:sldIdLst>
   <p:sldSz cx="12192000" cy="6858000"/>
   <p:notesSz cx="6858000" cy="9144000"/>
@@ -274,7 +279,7 @@
           <a:p>
             <a:fld id="{7AA4B683-9643-448A-92E1-C6392E401B19}" type="datetimeFigureOut">
               <a:rPr lang="en-GB" smtClean="0"/>
-              <a:t>01/12/2023</a:t>
+              <a:t>02/12/2023</a:t>
             </a:fld>
             <a:endParaRPr lang="en-GB"/>
           </a:p>
@@ -474,7 +479,7 @@
           <a:p>
             <a:fld id="{7AA4B683-9643-448A-92E1-C6392E401B19}" type="datetimeFigureOut">
               <a:rPr lang="en-GB" smtClean="0"/>
-              <a:t>01/12/2023</a:t>
+              <a:t>02/12/2023</a:t>
             </a:fld>
             <a:endParaRPr lang="en-GB"/>
           </a:p>
@@ -684,7 +689,7 @@
           <a:p>
             <a:fld id="{7AA4B683-9643-448A-92E1-C6392E401B19}" type="datetimeFigureOut">
               <a:rPr lang="en-GB" smtClean="0"/>
-              <a:t>01/12/2023</a:t>
+              <a:t>02/12/2023</a:t>
             </a:fld>
             <a:endParaRPr lang="en-GB"/>
           </a:p>
@@ -884,7 +889,7 @@
           <a:p>
             <a:fld id="{7AA4B683-9643-448A-92E1-C6392E401B19}" type="datetimeFigureOut">
               <a:rPr lang="en-GB" smtClean="0"/>
-              <a:t>01/12/2023</a:t>
+              <a:t>02/12/2023</a:t>
             </a:fld>
             <a:endParaRPr lang="en-GB"/>
           </a:p>
@@ -1160,7 +1165,7 @@
           <a:p>
             <a:fld id="{7AA4B683-9643-448A-92E1-C6392E401B19}" type="datetimeFigureOut">
               <a:rPr lang="en-GB" smtClean="0"/>
-              <a:t>01/12/2023</a:t>
+              <a:t>02/12/2023</a:t>
             </a:fld>
             <a:endParaRPr lang="en-GB"/>
           </a:p>
@@ -1428,7 +1433,7 @@
           <a:p>
             <a:fld id="{7AA4B683-9643-448A-92E1-C6392E401B19}" type="datetimeFigureOut">
               <a:rPr lang="en-GB" smtClean="0"/>
-              <a:t>01/12/2023</a:t>
+              <a:t>02/12/2023</a:t>
             </a:fld>
             <a:endParaRPr lang="en-GB"/>
           </a:p>
@@ -1843,7 +1848,7 @@
           <a:p>
             <a:fld id="{7AA4B683-9643-448A-92E1-C6392E401B19}" type="datetimeFigureOut">
               <a:rPr lang="en-GB" smtClean="0"/>
-              <a:t>01/12/2023</a:t>
+              <a:t>02/12/2023</a:t>
             </a:fld>
             <a:endParaRPr lang="en-GB"/>
           </a:p>
@@ -1985,7 +1990,7 @@
           <a:p>
             <a:fld id="{7AA4B683-9643-448A-92E1-C6392E401B19}" type="datetimeFigureOut">
               <a:rPr lang="en-GB" smtClean="0"/>
-              <a:t>01/12/2023</a:t>
+              <a:t>02/12/2023</a:t>
             </a:fld>
             <a:endParaRPr lang="en-GB"/>
           </a:p>
@@ -2098,7 +2103,7 @@
           <a:p>
             <a:fld id="{7AA4B683-9643-448A-92E1-C6392E401B19}" type="datetimeFigureOut">
               <a:rPr lang="en-GB" smtClean="0"/>
-              <a:t>01/12/2023</a:t>
+              <a:t>02/12/2023</a:t>
             </a:fld>
             <a:endParaRPr lang="en-GB"/>
           </a:p>
@@ -2411,7 +2416,7 @@
           <a:p>
             <a:fld id="{7AA4B683-9643-448A-92E1-C6392E401B19}" type="datetimeFigureOut">
               <a:rPr lang="en-GB" smtClean="0"/>
-              <a:t>01/12/2023</a:t>
+              <a:t>02/12/2023</a:t>
             </a:fld>
             <a:endParaRPr lang="en-GB"/>
           </a:p>
@@ -2700,7 +2705,7 @@
           <a:p>
             <a:fld id="{7AA4B683-9643-448A-92E1-C6392E401B19}" type="datetimeFigureOut">
               <a:rPr lang="en-GB" smtClean="0"/>
-              <a:t>01/12/2023</a:t>
+              <a:t>02/12/2023</a:t>
             </a:fld>
             <a:endParaRPr lang="en-GB"/>
           </a:p>
@@ -2949,7 +2954,7 @@
           <a:p>
             <a:fld id="{7AA4B683-9643-448A-92E1-C6392E401B19}" type="datetimeFigureOut">
               <a:rPr lang="en-GB" smtClean="0"/>
-              <a:t>01/12/2023</a:t>
+              <a:t>02/12/2023</a:t>
             </a:fld>
             <a:endParaRPr lang="en-GB"/>
           </a:p>
@@ -3388,14 +3393,78 @@
         </p:blipFill>
         <p:spPr>
           <a:xfrm>
-            <a:off x="3061862" y="165562"/>
-            <a:ext cx="5824963" cy="6526875"/>
+            <a:off x="3385135" y="1009638"/>
+            <a:ext cx="5045376" cy="5653347"/>
           </a:xfrm>
           <a:prstGeom prst="rect">
             <a:avLst/>
           </a:prstGeom>
         </p:spPr>
       </p:pic>
+      <p:sp>
+        <p:nvSpPr>
+          <p:cNvPr id="2" name="Title 1">
+            <a:extLst>
+              <a:ext uri="{FF2B5EF4-FFF2-40B4-BE49-F238E27FC236}">
+                <a16:creationId xmlns:a16="http://schemas.microsoft.com/office/drawing/2014/main" id="{99A069C2-6C02-5140-126C-9DACBE0C5CD3}"/>
+              </a:ext>
+            </a:extLst>
+          </p:cNvPr>
+          <p:cNvSpPr txBox="1">
+            <a:spLocks/>
+          </p:cNvSpPr>
+          <p:nvPr/>
+        </p:nvSpPr>
+        <p:spPr>
+          <a:xfrm>
+            <a:off x="120073" y="130360"/>
+            <a:ext cx="11942617" cy="627022"/>
+          </a:xfrm>
+          <a:prstGeom prst="rect">
+            <a:avLst/>
+          </a:prstGeom>
+          <a:solidFill>
+            <a:schemeClr val="bg1">
+              <a:lumMod val="50000"/>
+            </a:schemeClr>
+          </a:solidFill>
+          <a:ln>
+            <a:solidFill>
+              <a:schemeClr val="bg1"/>
+            </a:solidFill>
+          </a:ln>
+        </p:spPr>
+        <p:txBody>
+          <a:bodyPr vert="horz" lIns="91440" tIns="45720" rIns="91440" bIns="45720" rtlCol="0" anchor="b">
+            <a:normAutofit fontScale="90000" lnSpcReduction="10000"/>
+          </a:bodyPr>
+          <a:lstStyle>
+            <a:lvl1pPr algn="ctr" defTabSz="914400" rtl="0" eaLnBrk="1" latinLnBrk="0" hangingPunct="1">
+              <a:lnSpc>
+                <a:spcPct val="90000"/>
+              </a:lnSpc>
+              <a:spcBef>
+                <a:spcPct val="0"/>
+              </a:spcBef>
+              <a:buNone/>
+              <a:defRPr sz="6000" kern="1200">
+                <a:solidFill>
+                  <a:schemeClr val="tx1"/>
+                </a:solidFill>
+                <a:latin typeface="+mj-lt"/>
+                <a:ea typeface="+mj-ea"/>
+                <a:cs typeface="+mj-cs"/>
+              </a:defRPr>
+            </a:lvl1pPr>
+          </a:lstStyle>
+          <a:p>
+            <a:r>
+              <a:rPr lang="en-GB" sz="4400" b="1" dirty="0"/>
+              <a:t>Choice of Topic </a:t>
+            </a:r>
+          </a:p>
+        </p:txBody>
+      </p:sp>
     </p:spTree>
     <p:extLst>
       <p:ext uri="{BB962C8B-B14F-4D97-AF65-F5344CB8AC3E}">
@@ -3428,10 +3497,10 @@
       </p:grpSpPr>
       <p:sp>
         <p:nvSpPr>
-          <p:cNvPr id="2" name="Title 1">
-            <a:extLst>
-              <a:ext uri="{FF2B5EF4-FFF2-40B4-BE49-F238E27FC236}">
-                <a16:creationId xmlns:a16="http://schemas.microsoft.com/office/drawing/2014/main" id="{44F0457C-EE58-0F09-2A26-FF2A2A5D7A6C}"/>
+          <p:cNvPr id="6" name="Title 1">
+            <a:extLst>
+              <a:ext uri="{FF2B5EF4-FFF2-40B4-BE49-F238E27FC236}">
+                <a16:creationId xmlns:a16="http://schemas.microsoft.com/office/drawing/2014/main" id="{77F2EEAC-09DE-ECD3-B900-2383FDE1E4C1}"/>
               </a:ext>
             </a:extLst>
           </p:cNvPr>
@@ -3444,9 +3513,19 @@
         </p:nvSpPr>
         <p:spPr>
           <a:xfrm>
-            <a:off x="838199" y="111889"/>
-            <a:ext cx="10515600" cy="567748"/>
+            <a:off x="166254" y="134218"/>
+            <a:ext cx="11859491" cy="567748"/>
           </a:xfrm>
+          <a:solidFill>
+            <a:schemeClr val="bg1">
+              <a:lumMod val="50000"/>
+            </a:schemeClr>
+          </a:solidFill>
+          <a:ln>
+            <a:solidFill>
+              <a:schemeClr val="bg1"/>
+            </a:solidFill>
+          </a:ln>
         </p:spPr>
         <p:txBody>
           <a:bodyPr>
@@ -3456,11 +3535,123 @@
           <a:p>
             <a:pPr algn="ctr"/>
             <a:r>
-              <a:rPr lang="en-GB" dirty="0">
+              <a:rPr lang="en-GB" b="1" dirty="0"/>
+              <a:t>Q1 Analysis</a:t>
+            </a:r>
+          </a:p>
+        </p:txBody>
+      </p:sp>
+      <p:sp>
+        <p:nvSpPr>
+          <p:cNvPr id="8" name="TextBox 7">
+            <a:extLst>
+              <a:ext uri="{FF2B5EF4-FFF2-40B4-BE49-F238E27FC236}">
+                <a16:creationId xmlns:a16="http://schemas.microsoft.com/office/drawing/2014/main" id="{6036633F-CBFC-8545-6B3B-F2179BE59A18}"/>
+              </a:ext>
+            </a:extLst>
+          </p:cNvPr>
+          <p:cNvSpPr txBox="1"/>
+          <p:nvPr/>
+        </p:nvSpPr>
+        <p:spPr>
+          <a:xfrm>
+            <a:off x="-83128" y="1177744"/>
+            <a:ext cx="11859492" cy="1077218"/>
+          </a:xfrm>
+          <a:prstGeom prst="rect">
+            <a:avLst/>
+          </a:prstGeom>
+          <a:noFill/>
+        </p:spPr>
+        <p:txBody>
+          <a:bodyPr wrap="square">
+            <a:spAutoFit/>
+          </a:bodyPr>
+          <a:lstStyle/>
+          <a:p>
+            <a:pPr lvl="1"/>
+            <a:r>
+              <a:rPr lang="en-GB" sz="3200" dirty="0">
                 <a:solidFill>
                   <a:schemeClr val="bg1"/>
                 </a:solidFill>
               </a:rPr>
+              <a:t>What effect do gender, ethnicity and social class have on GCSE outcomes?</a:t>
+            </a:r>
+          </a:p>
+        </p:txBody>
+      </p:sp>
+    </p:spTree>
+    <p:extLst>
+      <p:ext uri="{BB962C8B-B14F-4D97-AF65-F5344CB8AC3E}">
+        <p14:creationId xmlns:p14="http://schemas.microsoft.com/office/powerpoint/2010/main" val="217715848"/>
+      </p:ext>
+    </p:extLst>
+  </p:cSld>
+  <p:clrMapOvr>
+    <a:masterClrMapping/>
+  </p:clrMapOvr>
+</p:sld>
+</file>
+
+<file path=ppt/slides/slide11.xml><?xml version="1.0" encoding="utf-8"?>
+<p:sld xmlns:a="http://schemas.openxmlformats.org/drawingml/2006/main" xmlns:r="http://schemas.openxmlformats.org/officeDocument/2006/relationships" xmlns:p="http://schemas.openxmlformats.org/presentationml/2006/main">
+  <p:cSld>
+    <p:spTree>
+      <p:nvGrpSpPr>
+        <p:cNvPr id="1" name=""/>
+        <p:cNvGrpSpPr/>
+        <p:nvPr/>
+      </p:nvGrpSpPr>
+      <p:grpSpPr>
+        <a:xfrm>
+          <a:off x="0" y="0"/>
+          <a:ext cx="0" cy="0"/>
+          <a:chOff x="0" y="0"/>
+          <a:chExt cx="0" cy="0"/>
+        </a:xfrm>
+      </p:grpSpPr>
+      <p:sp>
+        <p:nvSpPr>
+          <p:cNvPr id="2" name="Title 1">
+            <a:extLst>
+              <a:ext uri="{FF2B5EF4-FFF2-40B4-BE49-F238E27FC236}">
+                <a16:creationId xmlns:a16="http://schemas.microsoft.com/office/drawing/2014/main" id="{44F0457C-EE58-0F09-2A26-FF2A2A5D7A6C}"/>
+              </a:ext>
+            </a:extLst>
+          </p:cNvPr>
+          <p:cNvSpPr>
+            <a:spLocks noGrp="1"/>
+          </p:cNvSpPr>
+          <p:nvPr>
+            <p:ph type="title"/>
+          </p:nvPr>
+        </p:nvSpPr>
+        <p:spPr>
+          <a:xfrm>
+            <a:off x="202128" y="111889"/>
+            <a:ext cx="11860562" cy="567748"/>
+          </a:xfrm>
+          <a:solidFill>
+            <a:schemeClr val="bg1">
+              <a:lumMod val="50000"/>
+            </a:schemeClr>
+          </a:solidFill>
+          <a:ln>
+            <a:solidFill>
+              <a:schemeClr val="bg1"/>
+            </a:solidFill>
+          </a:ln>
+        </p:spPr>
+        <p:txBody>
+          <a:bodyPr>
+            <a:normAutofit fontScale="90000"/>
+          </a:bodyPr>
+          <a:lstStyle/>
+          <a:p>
+            <a:pPr algn="ctr"/>
+            <a:r>
+              <a:rPr lang="en-GB" b="1" dirty="0"/>
               <a:t>Gender Analysis</a:t>
             </a:r>
           </a:p>
@@ -3623,7 +3814,7 @@
 </p:sld>
 </file>
 
-<file path=ppt/slides/slide11.xml><?xml version="1.0" encoding="utf-8"?>
+<file path=ppt/slides/slide12.xml><?xml version="1.0" encoding="utf-8"?>
 <p:sld xmlns:a="http://schemas.openxmlformats.org/drawingml/2006/main" xmlns:r="http://schemas.openxmlformats.org/officeDocument/2006/relationships" xmlns:p="http://schemas.openxmlformats.org/presentationml/2006/main">
   <p:cSld>
     <p:spTree>
@@ -3658,9 +3849,19 @@
         </p:nvSpPr>
         <p:spPr>
           <a:xfrm>
-            <a:off x="838200" y="189634"/>
-            <a:ext cx="10515600" cy="567748"/>
+            <a:off x="172710" y="143082"/>
+            <a:ext cx="11871508" cy="567748"/>
           </a:xfrm>
+          <a:solidFill>
+            <a:schemeClr val="bg1">
+              <a:lumMod val="50000"/>
+            </a:schemeClr>
+          </a:solidFill>
+          <a:ln>
+            <a:solidFill>
+              <a:schemeClr val="bg1"/>
+            </a:solidFill>
+          </a:ln>
         </p:spPr>
         <p:txBody>
           <a:bodyPr>
@@ -3670,11 +3871,7 @@
           <a:p>
             <a:pPr algn="ctr"/>
             <a:r>
-              <a:rPr lang="en-GB" dirty="0">
-                <a:solidFill>
-                  <a:schemeClr val="bg1"/>
-                </a:solidFill>
-              </a:rPr>
+              <a:rPr lang="en-GB" b="1" dirty="0"/>
               <a:t>Ethnicity Analysis</a:t>
             </a:r>
           </a:p>
@@ -3708,7 +3905,7 @@
         </p:blipFill>
         <p:spPr>
           <a:xfrm>
-            <a:off x="172710" y="757382"/>
+            <a:off x="172710" y="831270"/>
             <a:ext cx="5923290" cy="2930469"/>
           </a:xfrm>
           <a:prstGeom prst="rect">
@@ -3744,7 +3941,7 @@
         </p:blipFill>
         <p:spPr>
           <a:xfrm>
-            <a:off x="172710" y="3780954"/>
+            <a:off x="172710" y="3854842"/>
             <a:ext cx="5923290" cy="2887412"/>
           </a:xfrm>
           <a:prstGeom prst="rect">
@@ -3780,7 +3977,7 @@
         </p:blipFill>
         <p:spPr>
           <a:xfrm>
-            <a:off x="6185583" y="3780954"/>
+            <a:off x="6185583" y="3854842"/>
             <a:ext cx="5923290" cy="2915127"/>
           </a:xfrm>
           <a:prstGeom prst="rect">
@@ -3816,7 +4013,7 @@
         </p:blipFill>
         <p:spPr>
           <a:xfrm>
-            <a:off x="6185583" y="757381"/>
+            <a:off x="6185583" y="831269"/>
             <a:ext cx="5923290" cy="2930470"/>
           </a:xfrm>
           <a:prstGeom prst="rect">
@@ -3837,7 +4034,7 @@
 </p:sld>
 </file>
 
-<file path=ppt/slides/slide12.xml><?xml version="1.0" encoding="utf-8"?>
+<file path=ppt/slides/slide13.xml><?xml version="1.0" encoding="utf-8"?>
 <p:sld xmlns:a="http://schemas.openxmlformats.org/drawingml/2006/main" xmlns:r="http://schemas.openxmlformats.org/officeDocument/2006/relationships" xmlns:p="http://schemas.openxmlformats.org/presentationml/2006/main">
   <p:cSld>
     <p:spTree>
@@ -3872,9 +4069,19 @@
         </p:nvSpPr>
         <p:spPr>
           <a:xfrm>
-            <a:off x="838200" y="189634"/>
-            <a:ext cx="10515600" cy="567748"/>
+            <a:off x="169431" y="138556"/>
+            <a:ext cx="11763951" cy="567748"/>
           </a:xfrm>
+          <a:solidFill>
+            <a:schemeClr val="bg1">
+              <a:lumMod val="50000"/>
+            </a:schemeClr>
+          </a:solidFill>
+          <a:ln>
+            <a:solidFill>
+              <a:schemeClr val="bg1"/>
+            </a:solidFill>
+          </a:ln>
         </p:spPr>
         <p:txBody>
           <a:bodyPr>
@@ -3884,11 +4091,7 @@
           <a:p>
             <a:pPr algn="ctr"/>
             <a:r>
-              <a:rPr lang="en-GB" dirty="0">
-                <a:solidFill>
-                  <a:schemeClr val="bg1"/>
-                </a:solidFill>
-              </a:rPr>
+              <a:rPr lang="en-GB" b="1" dirty="0"/>
               <a:t>Social Class Analysis</a:t>
             </a:r>
           </a:p>
@@ -4051,7 +4254,7 @@
 </p:sld>
 </file>
 
-<file path=ppt/slides/slide13.xml><?xml version="1.0" encoding="utf-8"?>
+<file path=ppt/slides/slide14.xml><?xml version="1.0" encoding="utf-8"?>
 <p:sld xmlns:a="http://schemas.openxmlformats.org/drawingml/2006/main" xmlns:r="http://schemas.openxmlformats.org/officeDocument/2006/relationships" xmlns:p="http://schemas.openxmlformats.org/presentationml/2006/main">
   <p:cSld>
     <p:spTree>
@@ -4086,9 +4289,19 @@
         </p:nvSpPr>
         <p:spPr>
           <a:xfrm>
-            <a:off x="838200" y="189634"/>
-            <a:ext cx="10515600" cy="567748"/>
+            <a:off x="119598" y="115746"/>
+            <a:ext cx="11952804" cy="567748"/>
           </a:xfrm>
+          <a:solidFill>
+            <a:schemeClr val="bg1">
+              <a:lumMod val="50000"/>
+            </a:schemeClr>
+          </a:solidFill>
+          <a:ln>
+            <a:solidFill>
+              <a:schemeClr val="bg1"/>
+            </a:solidFill>
+          </a:ln>
         </p:spPr>
         <p:txBody>
           <a:bodyPr>
@@ -4098,11 +4311,7 @@
           <a:p>
             <a:pPr algn="ctr"/>
             <a:r>
-              <a:rPr lang="en-GB" dirty="0">
-                <a:solidFill>
-                  <a:schemeClr val="bg1"/>
-                </a:solidFill>
-              </a:rPr>
+              <a:rPr lang="en-GB" b="1" dirty="0"/>
               <a:t>Social Class and Ethnicity Analysis</a:t>
             </a:r>
           </a:p>
@@ -4265,7 +4474,1045 @@
 </p:sld>
 </file>
 
-<file path=ppt/slides/slide14.xml><?xml version="1.0" encoding="utf-8"?>
+<file path=ppt/slides/slide15.xml><?xml version="1.0" encoding="utf-8"?>
+<p:sld xmlns:a="http://schemas.openxmlformats.org/drawingml/2006/main" xmlns:r="http://schemas.openxmlformats.org/officeDocument/2006/relationships" xmlns:p="http://schemas.openxmlformats.org/presentationml/2006/main">
+  <p:cSld>
+    <p:spTree>
+      <p:nvGrpSpPr>
+        <p:cNvPr id="1" name=""/>
+        <p:cNvGrpSpPr/>
+        <p:nvPr/>
+      </p:nvGrpSpPr>
+      <p:grpSpPr>
+        <a:xfrm>
+          <a:off x="0" y="0"/>
+          <a:ext cx="0" cy="0"/>
+          <a:chOff x="0" y="0"/>
+          <a:chExt cx="0" cy="0"/>
+        </a:xfrm>
+      </p:grpSpPr>
+      <p:sp>
+        <p:nvSpPr>
+          <p:cNvPr id="5" name="Title 1">
+            <a:extLst>
+              <a:ext uri="{FF2B5EF4-FFF2-40B4-BE49-F238E27FC236}">
+                <a16:creationId xmlns:a16="http://schemas.microsoft.com/office/drawing/2014/main" id="{7726803A-ED6F-6249-0FA7-146D6C1AEE84}"/>
+              </a:ext>
+            </a:extLst>
+          </p:cNvPr>
+          <p:cNvSpPr>
+            <a:spLocks noGrp="1"/>
+          </p:cNvSpPr>
+          <p:nvPr>
+            <p:ph type="title"/>
+          </p:nvPr>
+        </p:nvSpPr>
+        <p:spPr>
+          <a:xfrm>
+            <a:off x="184727" y="143454"/>
+            <a:ext cx="11813309" cy="567748"/>
+          </a:xfrm>
+          <a:solidFill>
+            <a:schemeClr val="bg1">
+              <a:lumMod val="50000"/>
+            </a:schemeClr>
+          </a:solidFill>
+          <a:ln>
+            <a:solidFill>
+              <a:schemeClr val="bg1"/>
+            </a:solidFill>
+          </a:ln>
+        </p:spPr>
+        <p:txBody>
+          <a:bodyPr>
+            <a:normAutofit fontScale="90000"/>
+          </a:bodyPr>
+          <a:lstStyle/>
+          <a:p>
+            <a:pPr algn="ctr"/>
+            <a:r>
+              <a:rPr lang="en-GB" b="1" dirty="0" err="1"/>
+              <a:t>Annova</a:t>
+            </a:r>
+            <a:r>
+              <a:rPr lang="en-GB" b="1" dirty="0"/>
+              <a:t> Test on Gender, Ethnicity and Class</a:t>
+            </a:r>
+          </a:p>
+        </p:txBody>
+      </p:sp>
+      <p:graphicFrame>
+        <p:nvGraphicFramePr>
+          <p:cNvPr id="6" name="Table 5">
+            <a:extLst>
+              <a:ext uri="{FF2B5EF4-FFF2-40B4-BE49-F238E27FC236}">
+                <a16:creationId xmlns:a16="http://schemas.microsoft.com/office/drawing/2014/main" id="{8AD44467-EC1C-3E32-B9C6-63BF2BA00736}"/>
+              </a:ext>
+            </a:extLst>
+          </p:cNvPr>
+          <p:cNvGraphicFramePr>
+            <a:graphicFrameLocks noGrp="1"/>
+          </p:cNvGraphicFramePr>
+          <p:nvPr>
+            <p:extLst>
+              <p:ext uri="{D42A27DB-BD31-4B8C-83A1-F6EECF244321}">
+                <p14:modId xmlns:p14="http://schemas.microsoft.com/office/powerpoint/2010/main" val="3660033524"/>
+              </p:ext>
+            </p:extLst>
+          </p:nvPr>
+        </p:nvGraphicFramePr>
+        <p:xfrm>
+          <a:off x="1773381" y="1403927"/>
+          <a:ext cx="8201892" cy="2475348"/>
+        </p:xfrm>
+        <a:graphic>
+          <a:graphicData uri="http://schemas.openxmlformats.org/drawingml/2006/table">
+            <a:tbl>
+              <a:tblPr firstRow="1" bandRow="1">
+                <a:tableStyleId>{5C22544A-7EE6-4342-B048-85BDC9FD1C3A}</a:tableStyleId>
+              </a:tblPr>
+              <a:tblGrid>
+                <a:gridCol w="4100946">
+                  <a:extLst>
+                    <a:ext uri="{9D8B030D-6E8A-4147-A177-3AD203B41FA5}">
+                      <a16:colId xmlns:a16="http://schemas.microsoft.com/office/drawing/2014/main" val="3999147665"/>
+                    </a:ext>
+                  </a:extLst>
+                </a:gridCol>
+                <a:gridCol w="4100946">
+                  <a:extLst>
+                    <a:ext uri="{9D8B030D-6E8A-4147-A177-3AD203B41FA5}">
+                      <a16:colId xmlns:a16="http://schemas.microsoft.com/office/drawing/2014/main" val="1214580130"/>
+                    </a:ext>
+                  </a:extLst>
+                </a:gridCol>
+              </a:tblGrid>
+              <a:tr h="597477">
+                <a:tc>
+                  <a:txBody>
+                    <a:bodyPr/>
+                    <a:lstStyle/>
+                    <a:p>
+                      <a:pPr lvl="1" algn="l"/>
+                      <a:endParaRPr lang="en-GB" sz="2800" b="0" dirty="0">
+                        <a:solidFill>
+                          <a:schemeClr val="bg1"/>
+                        </a:solidFill>
+                      </a:endParaRPr>
+                    </a:p>
+                  </a:txBody>
+                  <a:tcPr>
+                    <a:lnL w="12700" cap="flat" cmpd="sng" algn="ctr">
+                      <a:solidFill>
+                        <a:schemeClr val="bg1"/>
+                      </a:solidFill>
+                      <a:prstDash val="solid"/>
+                      <a:round/>
+                      <a:headEnd type="none" w="med" len="med"/>
+                      <a:tailEnd type="none" w="med" len="med"/>
+                    </a:lnL>
+                    <a:lnR w="12700" cap="flat" cmpd="sng" algn="ctr">
+                      <a:solidFill>
+                        <a:schemeClr val="bg1"/>
+                      </a:solidFill>
+                      <a:prstDash val="solid"/>
+                      <a:round/>
+                      <a:headEnd type="none" w="med" len="med"/>
+                      <a:tailEnd type="none" w="med" len="med"/>
+                    </a:lnR>
+                    <a:lnT w="12700" cap="flat" cmpd="sng" algn="ctr">
+                      <a:solidFill>
+                        <a:schemeClr val="bg1"/>
+                      </a:solidFill>
+                      <a:prstDash val="solid"/>
+                      <a:round/>
+                      <a:headEnd type="none" w="med" len="med"/>
+                      <a:tailEnd type="none" w="med" len="med"/>
+                    </a:lnT>
+                    <a:lnB w="12700" cap="flat" cmpd="sng" algn="ctr">
+                      <a:solidFill>
+                        <a:schemeClr val="bg1"/>
+                      </a:solidFill>
+                      <a:prstDash val="solid"/>
+                      <a:round/>
+                      <a:headEnd type="none" w="med" len="med"/>
+                      <a:tailEnd type="none" w="med" len="med"/>
+                    </a:lnB>
+                    <a:solidFill>
+                      <a:schemeClr val="bg1">
+                        <a:lumMod val="50000"/>
+                      </a:schemeClr>
+                    </a:solidFill>
+                  </a:tcPr>
+                </a:tc>
+                <a:tc>
+                  <a:txBody>
+                    <a:bodyPr/>
+                    <a:lstStyle/>
+                    <a:p>
+                      <a:pPr lvl="1" algn="l"/>
+                      <a:r>
+                        <a:rPr lang="en-GB" sz="2800" b="0" dirty="0">
+                          <a:solidFill>
+                            <a:schemeClr val="tx1"/>
+                          </a:solidFill>
+                        </a:rPr>
+                        <a:t>p-value</a:t>
+                      </a:r>
+                    </a:p>
+                  </a:txBody>
+                  <a:tcPr>
+                    <a:lnL w="12700" cap="flat" cmpd="sng" algn="ctr">
+                      <a:solidFill>
+                        <a:schemeClr val="bg1"/>
+                      </a:solidFill>
+                      <a:prstDash val="solid"/>
+                      <a:round/>
+                      <a:headEnd type="none" w="med" len="med"/>
+                      <a:tailEnd type="none" w="med" len="med"/>
+                    </a:lnL>
+                    <a:lnR w="12700" cap="flat" cmpd="sng" algn="ctr">
+                      <a:solidFill>
+                        <a:schemeClr val="bg1"/>
+                      </a:solidFill>
+                      <a:prstDash val="solid"/>
+                      <a:round/>
+                      <a:headEnd type="none" w="med" len="med"/>
+                      <a:tailEnd type="none" w="med" len="med"/>
+                    </a:lnR>
+                    <a:lnT w="12700" cap="flat" cmpd="sng" algn="ctr">
+                      <a:solidFill>
+                        <a:schemeClr val="bg1"/>
+                      </a:solidFill>
+                      <a:prstDash val="solid"/>
+                      <a:round/>
+                      <a:headEnd type="none" w="med" len="med"/>
+                      <a:tailEnd type="none" w="med" len="med"/>
+                    </a:lnT>
+                    <a:lnB w="12700" cap="flat" cmpd="sng" algn="ctr">
+                      <a:solidFill>
+                        <a:schemeClr val="bg1"/>
+                      </a:solidFill>
+                      <a:prstDash val="solid"/>
+                      <a:round/>
+                      <a:headEnd type="none" w="med" len="med"/>
+                      <a:tailEnd type="none" w="med" len="med"/>
+                    </a:lnB>
+                    <a:solidFill>
+                      <a:schemeClr val="bg1">
+                        <a:lumMod val="50000"/>
+                      </a:schemeClr>
+                    </a:solidFill>
+                  </a:tcPr>
+                </a:tc>
+                <a:extLst>
+                  <a:ext uri="{0D108BD9-81ED-4DB2-BD59-A6C34878D82A}">
+                    <a16:rowId xmlns:a16="http://schemas.microsoft.com/office/drawing/2014/main" val="3421434811"/>
+                  </a:ext>
+                </a:extLst>
+              </a:tr>
+              <a:tr h="625957">
+                <a:tc>
+                  <a:txBody>
+                    <a:bodyPr/>
+                    <a:lstStyle/>
+                    <a:p>
+                      <a:pPr lvl="1" algn="l"/>
+                      <a:r>
+                        <a:rPr lang="en-GB" sz="2800" b="0" dirty="0">
+                          <a:solidFill>
+                            <a:schemeClr val="bg1"/>
+                          </a:solidFill>
+                        </a:rPr>
+                        <a:t>Gender</a:t>
+                      </a:r>
+                    </a:p>
+                  </a:txBody>
+                  <a:tcPr anchor="ctr">
+                    <a:lnL w="12700" cap="flat" cmpd="sng" algn="ctr">
+                      <a:solidFill>
+                        <a:schemeClr val="bg1"/>
+                      </a:solidFill>
+                      <a:prstDash val="solid"/>
+                      <a:round/>
+                      <a:headEnd type="none" w="med" len="med"/>
+                      <a:tailEnd type="none" w="med" len="med"/>
+                    </a:lnL>
+                    <a:lnR w="12700" cap="flat" cmpd="sng" algn="ctr">
+                      <a:solidFill>
+                        <a:schemeClr val="bg1"/>
+                      </a:solidFill>
+                      <a:prstDash val="solid"/>
+                      <a:round/>
+                      <a:headEnd type="none" w="med" len="med"/>
+                      <a:tailEnd type="none" w="med" len="med"/>
+                    </a:lnR>
+                    <a:lnT w="12700" cap="flat" cmpd="sng" algn="ctr">
+                      <a:solidFill>
+                        <a:schemeClr val="bg1"/>
+                      </a:solidFill>
+                      <a:prstDash val="solid"/>
+                      <a:round/>
+                      <a:headEnd type="none" w="med" len="med"/>
+                      <a:tailEnd type="none" w="med" len="med"/>
+                    </a:lnT>
+                    <a:lnB w="12700" cap="flat" cmpd="sng" algn="ctr">
+                      <a:solidFill>
+                        <a:schemeClr val="bg1"/>
+                      </a:solidFill>
+                      <a:prstDash val="solid"/>
+                      <a:round/>
+                      <a:headEnd type="none" w="med" len="med"/>
+                      <a:tailEnd type="none" w="med" len="med"/>
+                    </a:lnB>
+                    <a:noFill/>
+                  </a:tcPr>
+                </a:tc>
+                <a:tc>
+                  <a:txBody>
+                    <a:bodyPr/>
+                    <a:lstStyle/>
+                    <a:p>
+                      <a:pPr lvl="1" algn="l"/>
+                      <a:r>
+                        <a:rPr lang="en-GB" sz="2800" b="0" dirty="0">
+                          <a:solidFill>
+                            <a:schemeClr val="bg1"/>
+                          </a:solidFill>
+                        </a:rPr>
+                        <a:t>0.004</a:t>
+                      </a:r>
+                    </a:p>
+                  </a:txBody>
+                  <a:tcPr anchor="ctr">
+                    <a:lnL w="12700" cap="flat" cmpd="sng" algn="ctr">
+                      <a:solidFill>
+                        <a:schemeClr val="bg1"/>
+                      </a:solidFill>
+                      <a:prstDash val="solid"/>
+                      <a:round/>
+                      <a:headEnd type="none" w="med" len="med"/>
+                      <a:tailEnd type="none" w="med" len="med"/>
+                    </a:lnL>
+                    <a:lnR w="12700" cap="flat" cmpd="sng" algn="ctr">
+                      <a:solidFill>
+                        <a:schemeClr val="bg1"/>
+                      </a:solidFill>
+                      <a:prstDash val="solid"/>
+                      <a:round/>
+                      <a:headEnd type="none" w="med" len="med"/>
+                      <a:tailEnd type="none" w="med" len="med"/>
+                    </a:lnR>
+                    <a:lnT w="12700" cap="flat" cmpd="sng" algn="ctr">
+                      <a:solidFill>
+                        <a:schemeClr val="bg1"/>
+                      </a:solidFill>
+                      <a:prstDash val="solid"/>
+                      <a:round/>
+                      <a:headEnd type="none" w="med" len="med"/>
+                      <a:tailEnd type="none" w="med" len="med"/>
+                    </a:lnT>
+                    <a:lnB w="12700" cap="flat" cmpd="sng" algn="ctr">
+                      <a:solidFill>
+                        <a:schemeClr val="bg1"/>
+                      </a:solidFill>
+                      <a:prstDash val="solid"/>
+                      <a:round/>
+                      <a:headEnd type="none" w="med" len="med"/>
+                      <a:tailEnd type="none" w="med" len="med"/>
+                    </a:lnB>
+                    <a:noFill/>
+                  </a:tcPr>
+                </a:tc>
+                <a:extLst>
+                  <a:ext uri="{0D108BD9-81ED-4DB2-BD59-A6C34878D82A}">
+                    <a16:rowId xmlns:a16="http://schemas.microsoft.com/office/drawing/2014/main" val="963515667"/>
+                  </a:ext>
+                </a:extLst>
+              </a:tr>
+              <a:tr h="625957">
+                <a:tc>
+                  <a:txBody>
+                    <a:bodyPr/>
+                    <a:lstStyle/>
+                    <a:p>
+                      <a:pPr lvl="1" algn="l"/>
+                      <a:r>
+                        <a:rPr lang="en-GB" sz="2800" b="0" dirty="0">
+                          <a:solidFill>
+                            <a:schemeClr val="bg1"/>
+                          </a:solidFill>
+                        </a:rPr>
+                        <a:t>Ethnicity</a:t>
+                      </a:r>
+                    </a:p>
+                  </a:txBody>
+                  <a:tcPr anchor="ctr">
+                    <a:lnL w="12700" cap="flat" cmpd="sng" algn="ctr">
+                      <a:solidFill>
+                        <a:schemeClr val="bg1"/>
+                      </a:solidFill>
+                      <a:prstDash val="solid"/>
+                      <a:round/>
+                      <a:headEnd type="none" w="med" len="med"/>
+                      <a:tailEnd type="none" w="med" len="med"/>
+                    </a:lnL>
+                    <a:lnR w="12700" cap="flat" cmpd="sng" algn="ctr">
+                      <a:solidFill>
+                        <a:schemeClr val="bg1"/>
+                      </a:solidFill>
+                      <a:prstDash val="solid"/>
+                      <a:round/>
+                      <a:headEnd type="none" w="med" len="med"/>
+                      <a:tailEnd type="none" w="med" len="med"/>
+                    </a:lnR>
+                    <a:lnT w="12700" cap="flat" cmpd="sng" algn="ctr">
+                      <a:solidFill>
+                        <a:schemeClr val="bg1"/>
+                      </a:solidFill>
+                      <a:prstDash val="solid"/>
+                      <a:round/>
+                      <a:headEnd type="none" w="med" len="med"/>
+                      <a:tailEnd type="none" w="med" len="med"/>
+                    </a:lnT>
+                    <a:lnB w="12700" cap="flat" cmpd="sng" algn="ctr">
+                      <a:solidFill>
+                        <a:schemeClr val="bg1"/>
+                      </a:solidFill>
+                      <a:prstDash val="solid"/>
+                      <a:round/>
+                      <a:headEnd type="none" w="med" len="med"/>
+                      <a:tailEnd type="none" w="med" len="med"/>
+                    </a:lnB>
+                    <a:noFill/>
+                  </a:tcPr>
+                </a:tc>
+                <a:tc>
+                  <a:txBody>
+                    <a:bodyPr/>
+                    <a:lstStyle/>
+                    <a:p>
+                      <a:pPr lvl="1" algn="l"/>
+                      <a:r>
+                        <a:rPr lang="en-GB" sz="2800" b="0" dirty="0">
+                          <a:solidFill>
+                            <a:schemeClr val="bg1"/>
+                          </a:solidFill>
+                        </a:rPr>
+                        <a:t>0.0006</a:t>
+                      </a:r>
+                    </a:p>
+                  </a:txBody>
+                  <a:tcPr anchor="ctr">
+                    <a:lnL w="12700" cap="flat" cmpd="sng" algn="ctr">
+                      <a:solidFill>
+                        <a:schemeClr val="bg1"/>
+                      </a:solidFill>
+                      <a:prstDash val="solid"/>
+                      <a:round/>
+                      <a:headEnd type="none" w="med" len="med"/>
+                      <a:tailEnd type="none" w="med" len="med"/>
+                    </a:lnL>
+                    <a:lnR w="12700" cap="flat" cmpd="sng" algn="ctr">
+                      <a:solidFill>
+                        <a:schemeClr val="bg1"/>
+                      </a:solidFill>
+                      <a:prstDash val="solid"/>
+                      <a:round/>
+                      <a:headEnd type="none" w="med" len="med"/>
+                      <a:tailEnd type="none" w="med" len="med"/>
+                    </a:lnR>
+                    <a:lnT w="12700" cap="flat" cmpd="sng" algn="ctr">
+                      <a:solidFill>
+                        <a:schemeClr val="bg1"/>
+                      </a:solidFill>
+                      <a:prstDash val="solid"/>
+                      <a:round/>
+                      <a:headEnd type="none" w="med" len="med"/>
+                      <a:tailEnd type="none" w="med" len="med"/>
+                    </a:lnT>
+                    <a:lnB w="12700" cap="flat" cmpd="sng" algn="ctr">
+                      <a:solidFill>
+                        <a:schemeClr val="bg1"/>
+                      </a:solidFill>
+                      <a:prstDash val="solid"/>
+                      <a:round/>
+                      <a:headEnd type="none" w="med" len="med"/>
+                      <a:tailEnd type="none" w="med" len="med"/>
+                    </a:lnB>
+                    <a:noFill/>
+                  </a:tcPr>
+                </a:tc>
+                <a:extLst>
+                  <a:ext uri="{0D108BD9-81ED-4DB2-BD59-A6C34878D82A}">
+                    <a16:rowId xmlns:a16="http://schemas.microsoft.com/office/drawing/2014/main" val="400450146"/>
+                  </a:ext>
+                </a:extLst>
+              </a:tr>
+              <a:tr h="625957">
+                <a:tc>
+                  <a:txBody>
+                    <a:bodyPr/>
+                    <a:lstStyle/>
+                    <a:p>
+                      <a:pPr lvl="1" algn="l"/>
+                      <a:r>
+                        <a:rPr lang="en-GB" sz="2800" b="0" dirty="0">
+                          <a:solidFill>
+                            <a:schemeClr val="bg1"/>
+                          </a:solidFill>
+                        </a:rPr>
+                        <a:t>Free school meals</a:t>
+                      </a:r>
+                    </a:p>
+                  </a:txBody>
+                  <a:tcPr anchor="ctr">
+                    <a:lnL w="12700" cap="flat" cmpd="sng" algn="ctr">
+                      <a:solidFill>
+                        <a:schemeClr val="bg1"/>
+                      </a:solidFill>
+                      <a:prstDash val="solid"/>
+                      <a:round/>
+                      <a:headEnd type="none" w="med" len="med"/>
+                      <a:tailEnd type="none" w="med" len="med"/>
+                    </a:lnL>
+                    <a:lnR w="12700" cap="flat" cmpd="sng" algn="ctr">
+                      <a:solidFill>
+                        <a:schemeClr val="bg1"/>
+                      </a:solidFill>
+                      <a:prstDash val="solid"/>
+                      <a:round/>
+                      <a:headEnd type="none" w="med" len="med"/>
+                      <a:tailEnd type="none" w="med" len="med"/>
+                    </a:lnR>
+                    <a:lnT w="12700" cap="flat" cmpd="sng" algn="ctr">
+                      <a:solidFill>
+                        <a:schemeClr val="bg1"/>
+                      </a:solidFill>
+                      <a:prstDash val="solid"/>
+                      <a:round/>
+                      <a:headEnd type="none" w="med" len="med"/>
+                      <a:tailEnd type="none" w="med" len="med"/>
+                    </a:lnT>
+                    <a:lnB w="12700" cap="flat" cmpd="sng" algn="ctr">
+                      <a:solidFill>
+                        <a:schemeClr val="bg1"/>
+                      </a:solidFill>
+                      <a:prstDash val="solid"/>
+                      <a:round/>
+                      <a:headEnd type="none" w="med" len="med"/>
+                      <a:tailEnd type="none" w="med" len="med"/>
+                    </a:lnB>
+                    <a:noFill/>
+                  </a:tcPr>
+                </a:tc>
+                <a:tc>
+                  <a:txBody>
+                    <a:bodyPr/>
+                    <a:lstStyle/>
+                    <a:p>
+                      <a:pPr lvl="1" algn="l"/>
+                      <a:r>
+                        <a:rPr lang="en-GB" sz="2800" b="0" dirty="0">
+                          <a:solidFill>
+                            <a:schemeClr val="bg1"/>
+                          </a:solidFill>
+                        </a:rPr>
+                        <a:t>4.0 x 10</a:t>
+                      </a:r>
+                      <a:r>
+                        <a:rPr lang="en-GB" sz="2800" b="0" baseline="30000" dirty="0">
+                          <a:solidFill>
+                            <a:schemeClr val="bg1"/>
+                          </a:solidFill>
+                        </a:rPr>
+                        <a:t>6</a:t>
+                      </a:r>
+                      <a:endParaRPr lang="en-GB" sz="2800" b="0" dirty="0">
+                        <a:solidFill>
+                          <a:schemeClr val="bg1"/>
+                        </a:solidFill>
+                      </a:endParaRPr>
+                    </a:p>
+                  </a:txBody>
+                  <a:tcPr anchor="ctr">
+                    <a:lnL w="12700" cap="flat" cmpd="sng" algn="ctr">
+                      <a:solidFill>
+                        <a:schemeClr val="bg1"/>
+                      </a:solidFill>
+                      <a:prstDash val="solid"/>
+                      <a:round/>
+                      <a:headEnd type="none" w="med" len="med"/>
+                      <a:tailEnd type="none" w="med" len="med"/>
+                    </a:lnL>
+                    <a:lnR w="12700" cap="flat" cmpd="sng" algn="ctr">
+                      <a:solidFill>
+                        <a:schemeClr val="bg1"/>
+                      </a:solidFill>
+                      <a:prstDash val="solid"/>
+                      <a:round/>
+                      <a:headEnd type="none" w="med" len="med"/>
+                      <a:tailEnd type="none" w="med" len="med"/>
+                    </a:lnR>
+                    <a:lnT w="12700" cap="flat" cmpd="sng" algn="ctr">
+                      <a:solidFill>
+                        <a:schemeClr val="bg1"/>
+                      </a:solidFill>
+                      <a:prstDash val="solid"/>
+                      <a:round/>
+                      <a:headEnd type="none" w="med" len="med"/>
+                      <a:tailEnd type="none" w="med" len="med"/>
+                    </a:lnT>
+                    <a:lnB w="12700" cap="flat" cmpd="sng" algn="ctr">
+                      <a:solidFill>
+                        <a:schemeClr val="bg1"/>
+                      </a:solidFill>
+                      <a:prstDash val="solid"/>
+                      <a:round/>
+                      <a:headEnd type="none" w="med" len="med"/>
+                      <a:tailEnd type="none" w="med" len="med"/>
+                    </a:lnB>
+                    <a:noFill/>
+                  </a:tcPr>
+                </a:tc>
+                <a:extLst>
+                  <a:ext uri="{0D108BD9-81ED-4DB2-BD59-A6C34878D82A}">
+                    <a16:rowId xmlns:a16="http://schemas.microsoft.com/office/drawing/2014/main" val="927122033"/>
+                  </a:ext>
+                </a:extLst>
+              </a:tr>
+            </a:tbl>
+          </a:graphicData>
+        </a:graphic>
+      </p:graphicFrame>
+    </p:spTree>
+    <p:extLst>
+      <p:ext uri="{BB962C8B-B14F-4D97-AF65-F5344CB8AC3E}">
+        <p14:creationId xmlns:p14="http://schemas.microsoft.com/office/powerpoint/2010/main" val="2315461425"/>
+      </p:ext>
+    </p:extLst>
+  </p:cSld>
+  <p:clrMapOvr>
+    <a:masterClrMapping/>
+  </p:clrMapOvr>
+</p:sld>
+</file>
+
+<file path=ppt/slides/slide16.xml><?xml version="1.0" encoding="utf-8"?>
+<p:sld xmlns:a="http://schemas.openxmlformats.org/drawingml/2006/main" xmlns:r="http://schemas.openxmlformats.org/officeDocument/2006/relationships" xmlns:p="http://schemas.openxmlformats.org/presentationml/2006/main">
+  <p:cSld>
+    <p:spTree>
+      <p:nvGrpSpPr>
+        <p:cNvPr id="1" name=""/>
+        <p:cNvGrpSpPr/>
+        <p:nvPr/>
+      </p:nvGrpSpPr>
+      <p:grpSpPr>
+        <a:xfrm>
+          <a:off x="0" y="0"/>
+          <a:ext cx="0" cy="0"/>
+          <a:chOff x="0" y="0"/>
+          <a:chExt cx="0" cy="0"/>
+        </a:xfrm>
+      </p:grpSpPr>
+      <p:pic>
+        <p:nvPicPr>
+          <p:cNvPr id="5" name="Picture 4">
+            <a:extLst>
+              <a:ext uri="{FF2B5EF4-FFF2-40B4-BE49-F238E27FC236}">
+                <a16:creationId xmlns:a16="http://schemas.microsoft.com/office/drawing/2014/main" id="{C0E99941-8C9D-525F-365F-5F921600BEF3}"/>
+              </a:ext>
+            </a:extLst>
+          </p:cNvPr>
+          <p:cNvPicPr>
+            <a:picLocks noChangeAspect="1"/>
+          </p:cNvPicPr>
+          <p:nvPr/>
+        </p:nvPicPr>
+        <p:blipFill>
+          <a:blip r:embed="rId2"/>
+          <a:stretch>
+            <a:fillRect/>
+          </a:stretch>
+        </p:blipFill>
+        <p:spPr>
+          <a:xfrm>
+            <a:off x="7489013" y="1301728"/>
+            <a:ext cx="4444378" cy="2170208"/>
+          </a:xfrm>
+          <a:prstGeom prst="rect">
+            <a:avLst/>
+          </a:prstGeom>
+        </p:spPr>
+      </p:pic>
+      <p:pic>
+        <p:nvPicPr>
+          <p:cNvPr id="7" name="Picture 6">
+            <a:extLst>
+              <a:ext uri="{FF2B5EF4-FFF2-40B4-BE49-F238E27FC236}">
+                <a16:creationId xmlns:a16="http://schemas.microsoft.com/office/drawing/2014/main" id="{38F4AB8A-4FC2-4EFE-804D-6059488C6ABC}"/>
+              </a:ext>
+            </a:extLst>
+          </p:cNvPr>
+          <p:cNvPicPr>
+            <a:picLocks noChangeAspect="1"/>
+          </p:cNvPicPr>
+          <p:nvPr/>
+        </p:nvPicPr>
+        <p:blipFill>
+          <a:blip r:embed="rId3">
+            <a:extLst>
+              <a:ext uri="{28A0092B-C50C-407E-A947-70E740481C1C}">
+                <a14:useLocalDpi xmlns:a14="http://schemas.microsoft.com/office/drawing/2010/main" val="0"/>
+              </a:ext>
+            </a:extLst>
+          </a:blip>
+          <a:stretch>
+            <a:fillRect/>
+          </a:stretch>
+        </p:blipFill>
+        <p:spPr>
+          <a:xfrm>
+            <a:off x="258609" y="1301728"/>
+            <a:ext cx="7090906" cy="4254544"/>
+          </a:xfrm>
+          <a:prstGeom prst="rect">
+            <a:avLst/>
+          </a:prstGeom>
+        </p:spPr>
+      </p:pic>
+      <p:sp>
+        <p:nvSpPr>
+          <p:cNvPr id="8" name="Title 1">
+            <a:extLst>
+              <a:ext uri="{FF2B5EF4-FFF2-40B4-BE49-F238E27FC236}">
+                <a16:creationId xmlns:a16="http://schemas.microsoft.com/office/drawing/2014/main" id="{83995D7C-06AE-175C-5E38-FA51089F2626}"/>
+              </a:ext>
+            </a:extLst>
+          </p:cNvPr>
+          <p:cNvSpPr>
+            <a:spLocks noGrp="1"/>
+          </p:cNvSpPr>
+          <p:nvPr>
+            <p:ph type="title"/>
+          </p:nvPr>
+        </p:nvSpPr>
+        <p:spPr>
+          <a:xfrm>
+            <a:off x="184727" y="143453"/>
+            <a:ext cx="11813309" cy="567748"/>
+          </a:xfrm>
+          <a:solidFill>
+            <a:schemeClr val="bg1">
+              <a:lumMod val="50000"/>
+            </a:schemeClr>
+          </a:solidFill>
+          <a:ln>
+            <a:solidFill>
+              <a:schemeClr val="bg1"/>
+            </a:solidFill>
+          </a:ln>
+        </p:spPr>
+        <p:txBody>
+          <a:bodyPr>
+            <a:normAutofit fontScale="90000"/>
+          </a:bodyPr>
+          <a:lstStyle/>
+          <a:p>
+            <a:pPr algn="ctr"/>
+            <a:r>
+              <a:rPr lang="en-GB" b="1" dirty="0"/>
+              <a:t>Tukey Test on Gender, Ethnicity and Class</a:t>
+            </a:r>
+          </a:p>
+        </p:txBody>
+      </p:sp>
+    </p:spTree>
+    <p:extLst>
+      <p:ext uri="{BB962C8B-B14F-4D97-AF65-F5344CB8AC3E}">
+        <p14:creationId xmlns:p14="http://schemas.microsoft.com/office/powerpoint/2010/main" val="2907998863"/>
+      </p:ext>
+    </p:extLst>
+  </p:cSld>
+  <p:clrMapOvr>
+    <a:masterClrMapping/>
+  </p:clrMapOvr>
+</p:sld>
+</file>
+
+<file path=ppt/slides/slide17.xml><?xml version="1.0" encoding="utf-8"?>
+<p:sld xmlns:a="http://schemas.openxmlformats.org/drawingml/2006/main" xmlns:r="http://schemas.openxmlformats.org/officeDocument/2006/relationships" xmlns:p="http://schemas.openxmlformats.org/presentationml/2006/main">
+  <p:cSld>
+    <p:spTree>
+      <p:nvGrpSpPr>
+        <p:cNvPr id="1" name=""/>
+        <p:cNvGrpSpPr/>
+        <p:nvPr/>
+      </p:nvGrpSpPr>
+      <p:grpSpPr>
+        <a:xfrm>
+          <a:off x="0" y="0"/>
+          <a:ext cx="0" cy="0"/>
+          <a:chOff x="0" y="0"/>
+          <a:chExt cx="0" cy="0"/>
+        </a:xfrm>
+      </p:grpSpPr>
+      <p:sp>
+        <p:nvSpPr>
+          <p:cNvPr id="4" name="Title 1">
+            <a:extLst>
+              <a:ext uri="{FF2B5EF4-FFF2-40B4-BE49-F238E27FC236}">
+                <a16:creationId xmlns:a16="http://schemas.microsoft.com/office/drawing/2014/main" id="{BD13B1A0-3587-1F6A-A119-6DCD39B1176C}"/>
+              </a:ext>
+            </a:extLst>
+          </p:cNvPr>
+          <p:cNvSpPr>
+            <a:spLocks noGrp="1"/>
+          </p:cNvSpPr>
+          <p:nvPr>
+            <p:ph type="title"/>
+          </p:nvPr>
+        </p:nvSpPr>
+        <p:spPr>
+          <a:xfrm>
+            <a:off x="184727" y="143453"/>
+            <a:ext cx="11813309" cy="567748"/>
+          </a:xfrm>
+          <a:solidFill>
+            <a:schemeClr val="bg1">
+              <a:lumMod val="50000"/>
+            </a:schemeClr>
+          </a:solidFill>
+          <a:ln>
+            <a:solidFill>
+              <a:schemeClr val="bg1"/>
+            </a:solidFill>
+          </a:ln>
+        </p:spPr>
+        <p:txBody>
+          <a:bodyPr>
+            <a:normAutofit fontScale="90000"/>
+          </a:bodyPr>
+          <a:lstStyle/>
+          <a:p>
+            <a:pPr algn="ctr"/>
+            <a:r>
+              <a:rPr lang="en-GB" b="1" dirty="0"/>
+              <a:t>Tukey Test on All Combinations</a:t>
+            </a:r>
+          </a:p>
+        </p:txBody>
+      </p:sp>
+      <p:pic>
+        <p:nvPicPr>
+          <p:cNvPr id="6" name="Picture 5">
+            <a:extLst>
+              <a:ext uri="{FF2B5EF4-FFF2-40B4-BE49-F238E27FC236}">
+                <a16:creationId xmlns:a16="http://schemas.microsoft.com/office/drawing/2014/main" id="{6596988A-4A34-8BCB-903B-7DA2B8D7E274}"/>
+              </a:ext>
+            </a:extLst>
+          </p:cNvPr>
+          <p:cNvPicPr>
+            <a:picLocks noChangeAspect="1"/>
+          </p:cNvPicPr>
+          <p:nvPr/>
+        </p:nvPicPr>
+        <p:blipFill>
+          <a:blip r:embed="rId2">
+            <a:extLst>
+              <a:ext uri="{28A0092B-C50C-407E-A947-70E740481C1C}">
+                <a14:useLocalDpi xmlns:a14="http://schemas.microsoft.com/office/drawing/2010/main" val="0"/>
+              </a:ext>
+            </a:extLst>
+          </a:blip>
+          <a:stretch>
+            <a:fillRect/>
+          </a:stretch>
+        </p:blipFill>
+        <p:spPr>
+          <a:xfrm>
+            <a:off x="272471" y="863769"/>
+            <a:ext cx="10400146" cy="5850778"/>
+          </a:xfrm>
+          <a:prstGeom prst="rect">
+            <a:avLst/>
+          </a:prstGeom>
+        </p:spPr>
+      </p:pic>
+      <p:sp>
+        <p:nvSpPr>
+          <p:cNvPr id="7" name="TextBox 6">
+            <a:extLst>
+              <a:ext uri="{FF2B5EF4-FFF2-40B4-BE49-F238E27FC236}">
+                <a16:creationId xmlns:a16="http://schemas.microsoft.com/office/drawing/2014/main" id="{34960F78-8FB9-5CF2-4298-48187622B314}"/>
+              </a:ext>
+            </a:extLst>
+          </p:cNvPr>
+          <p:cNvSpPr txBox="1"/>
+          <p:nvPr/>
+        </p:nvSpPr>
+        <p:spPr>
+          <a:xfrm>
+            <a:off x="11083636" y="1043709"/>
+            <a:ext cx="561372" cy="369332"/>
+          </a:xfrm>
+          <a:prstGeom prst="rect">
+            <a:avLst/>
+          </a:prstGeom>
+          <a:noFill/>
+        </p:spPr>
+        <p:txBody>
+          <a:bodyPr wrap="none" rtlCol="0">
+            <a:spAutoFit/>
+          </a:bodyPr>
+          <a:lstStyle/>
+          <a:p>
+            <a:r>
+              <a:rPr lang="en-GB" dirty="0">
+                <a:solidFill>
+                  <a:schemeClr val="bg1"/>
+                </a:solidFill>
+                <a:hlinkClick r:id="rId3" action="ppaction://hlinkfile"/>
+              </a:rPr>
+              <a:t>Link</a:t>
+            </a:r>
+            <a:endParaRPr lang="en-GB" dirty="0">
+              <a:solidFill>
+                <a:schemeClr val="bg1"/>
+              </a:solidFill>
+            </a:endParaRPr>
+          </a:p>
+        </p:txBody>
+      </p:sp>
+    </p:spTree>
+    <p:extLst>
+      <p:ext uri="{BB962C8B-B14F-4D97-AF65-F5344CB8AC3E}">
+        <p14:creationId xmlns:p14="http://schemas.microsoft.com/office/powerpoint/2010/main" val="1019851551"/>
+      </p:ext>
+    </p:extLst>
+  </p:cSld>
+  <p:clrMapOvr>
+    <a:masterClrMapping/>
+  </p:clrMapOvr>
+</p:sld>
+</file>
+
+<file path=ppt/slides/slide18.xml><?xml version="1.0" encoding="utf-8"?>
+<p:sld xmlns:a="http://schemas.openxmlformats.org/drawingml/2006/main" xmlns:r="http://schemas.openxmlformats.org/officeDocument/2006/relationships" xmlns:p="http://schemas.openxmlformats.org/presentationml/2006/main">
+  <p:cSld>
+    <p:spTree>
+      <p:nvGrpSpPr>
+        <p:cNvPr id="1" name=""/>
+        <p:cNvGrpSpPr/>
+        <p:nvPr/>
+      </p:nvGrpSpPr>
+      <p:grpSpPr>
+        <a:xfrm>
+          <a:off x="0" y="0"/>
+          <a:ext cx="0" cy="0"/>
+          <a:chOff x="0" y="0"/>
+          <a:chExt cx="0" cy="0"/>
+        </a:xfrm>
+      </p:grpSpPr>
+      <p:sp>
+        <p:nvSpPr>
+          <p:cNvPr id="4" name="Title 1">
+            <a:extLst>
+              <a:ext uri="{FF2B5EF4-FFF2-40B4-BE49-F238E27FC236}">
+                <a16:creationId xmlns:a16="http://schemas.microsoft.com/office/drawing/2014/main" id="{9145BCE8-B494-0879-6A7D-843A72B4359C}"/>
+              </a:ext>
+            </a:extLst>
+          </p:cNvPr>
+          <p:cNvSpPr>
+            <a:spLocks noGrp="1"/>
+          </p:cNvSpPr>
+          <p:nvPr>
+            <p:ph type="title"/>
+          </p:nvPr>
+        </p:nvSpPr>
+        <p:spPr>
+          <a:xfrm>
+            <a:off x="184727" y="143453"/>
+            <a:ext cx="11813309" cy="567748"/>
+          </a:xfrm>
+          <a:solidFill>
+            <a:schemeClr val="bg1">
+              <a:lumMod val="50000"/>
+            </a:schemeClr>
+          </a:solidFill>
+          <a:ln>
+            <a:solidFill>
+              <a:schemeClr val="bg1"/>
+            </a:solidFill>
+          </a:ln>
+        </p:spPr>
+        <p:txBody>
+          <a:bodyPr>
+            <a:normAutofit fontScale="90000"/>
+          </a:bodyPr>
+          <a:lstStyle/>
+          <a:p>
+            <a:pPr algn="ctr"/>
+            <a:r>
+              <a:rPr lang="en-GB" b="1" dirty="0"/>
+              <a:t>Q1. Summary</a:t>
+            </a:r>
+          </a:p>
+        </p:txBody>
+      </p:sp>
+      <p:sp>
+        <p:nvSpPr>
+          <p:cNvPr id="5" name="TextBox 4">
+            <a:extLst>
+              <a:ext uri="{FF2B5EF4-FFF2-40B4-BE49-F238E27FC236}">
+                <a16:creationId xmlns:a16="http://schemas.microsoft.com/office/drawing/2014/main" id="{B2E5B747-AF67-7FF0-F4A1-21B547EA6C99}"/>
+              </a:ext>
+            </a:extLst>
+          </p:cNvPr>
+          <p:cNvSpPr txBox="1"/>
+          <p:nvPr/>
+        </p:nvSpPr>
+        <p:spPr>
+          <a:xfrm>
+            <a:off x="184727" y="997527"/>
+            <a:ext cx="11813308" cy="954107"/>
+          </a:xfrm>
+          <a:prstGeom prst="rect">
+            <a:avLst/>
+          </a:prstGeom>
+          <a:noFill/>
+        </p:spPr>
+        <p:txBody>
+          <a:bodyPr wrap="square" rtlCol="0">
+            <a:spAutoFit/>
+          </a:bodyPr>
+          <a:lstStyle/>
+          <a:p>
+            <a:r>
+              <a:rPr lang="en-GB" sz="2800" dirty="0">
+                <a:solidFill>
+                  <a:schemeClr val="bg1"/>
+                </a:solidFill>
+              </a:rPr>
+              <a:t>Gender, ethnicity and social class all have an effect on GCSE outcomes but the largest effect is due to social class.</a:t>
+            </a:r>
+          </a:p>
+        </p:txBody>
+      </p:sp>
+    </p:spTree>
+    <p:extLst>
+      <p:ext uri="{BB962C8B-B14F-4D97-AF65-F5344CB8AC3E}">
+        <p14:creationId xmlns:p14="http://schemas.microsoft.com/office/powerpoint/2010/main" val="3949997417"/>
+      </p:ext>
+    </p:extLst>
+  </p:cSld>
+  <p:clrMapOvr>
+    <a:masterClrMapping/>
+  </p:clrMapOvr>
+</p:sld>
+</file>
+
+<file path=ppt/slides/slide19.xml><?xml version="1.0" encoding="utf-8"?>
 <p:sld xmlns:a="http://schemas.openxmlformats.org/drawingml/2006/main" xmlns:r="http://schemas.openxmlformats.org/officeDocument/2006/relationships" xmlns:p="http://schemas.openxmlformats.org/presentationml/2006/main">
   <p:cSld>
     <p:spTree>
@@ -4387,7 +5634,7 @@
         <p:spPr>
           <a:xfrm>
             <a:off x="1095793" y="619125"/>
-            <a:ext cx="9792040" cy="5447645"/>
+            <a:ext cx="9792040" cy="4708981"/>
           </a:xfrm>
           <a:prstGeom prst="rect">
             <a:avLst/>
@@ -4401,13 +5648,21 @@
           <a:lstStyle/>
           <a:p>
             <a:pPr algn="ctr"/>
-            <a:r>
-              <a:rPr lang="en-GB" sz="4800" u="sng" dirty="0">
+            <a:endParaRPr lang="en-GB" sz="3600" dirty="0">
+              <a:solidFill>
+                <a:schemeClr val="bg1"/>
+              </a:solidFill>
+            </a:endParaRPr>
+          </a:p>
+          <a:p>
+            <a:pPr algn="ctr"/>
+            <a:r>
+              <a:rPr lang="en-GB" sz="3600" dirty="0">
                 <a:solidFill>
                   <a:schemeClr val="bg1"/>
                 </a:solidFill>
               </a:rPr>
-              <a:t>Project 1 </a:t>
+              <a:t>An Analysis of GCSE Examination Results in England</a:t>
             </a:r>
           </a:p>
           <a:p>
@@ -4421,25 +5676,6 @@
           <a:p>
             <a:pPr algn="ctr"/>
             <a:r>
-              <a:rPr lang="en-GB" sz="3600" dirty="0">
-                <a:solidFill>
-                  <a:schemeClr val="bg1"/>
-                </a:solidFill>
-              </a:rPr>
-              <a:t>An Analysis of GCSE Examination Results in England</a:t>
-            </a:r>
-          </a:p>
-          <a:p>
-            <a:pPr algn="ctr"/>
-            <a:endParaRPr lang="en-GB" sz="3600" dirty="0">
-              <a:solidFill>
-                <a:schemeClr val="bg1"/>
-              </a:solidFill>
-            </a:endParaRPr>
-          </a:p>
-          <a:p>
-            <a:pPr algn="ctr"/>
-            <a:r>
               <a:rPr lang="en-GB" sz="2400" dirty="0">
                 <a:solidFill>
                   <a:schemeClr val="bg1"/>
@@ -4549,6 +5785,70 @@
                 </a:solidFill>
               </a:rPr>
               <a:t>Adel Mahmud</a:t>
+            </a:r>
+          </a:p>
+        </p:txBody>
+      </p:sp>
+      <p:sp>
+        <p:nvSpPr>
+          <p:cNvPr id="2" name="Title 1">
+            <a:extLst>
+              <a:ext uri="{FF2B5EF4-FFF2-40B4-BE49-F238E27FC236}">
+                <a16:creationId xmlns:a16="http://schemas.microsoft.com/office/drawing/2014/main" id="{EC4D7C4F-5846-C17B-155D-3E35CB7C06DF}"/>
+              </a:ext>
+            </a:extLst>
+          </p:cNvPr>
+          <p:cNvSpPr txBox="1">
+            <a:spLocks/>
+          </p:cNvSpPr>
+          <p:nvPr/>
+        </p:nvSpPr>
+        <p:spPr>
+          <a:xfrm>
+            <a:off x="152400" y="147781"/>
+            <a:ext cx="11887200" cy="591128"/>
+          </a:xfrm>
+          <a:prstGeom prst="rect">
+            <a:avLst/>
+          </a:prstGeom>
+          <a:solidFill>
+            <a:schemeClr val="bg1">
+              <a:lumMod val="50000"/>
+            </a:schemeClr>
+          </a:solidFill>
+          <a:ln>
+            <a:solidFill>
+              <a:schemeClr val="bg1"/>
+            </a:solidFill>
+          </a:ln>
+        </p:spPr>
+        <p:txBody>
+          <a:bodyPr vert="horz" lIns="91440" tIns="45720" rIns="91440" bIns="45720" rtlCol="0" anchor="b">
+            <a:normAutofit fontScale="90000" lnSpcReduction="20000"/>
+          </a:bodyPr>
+          <a:lstStyle>
+            <a:lvl1pPr algn="ctr" defTabSz="914400" rtl="0" eaLnBrk="1" latinLnBrk="0" hangingPunct="1">
+              <a:lnSpc>
+                <a:spcPct val="90000"/>
+              </a:lnSpc>
+              <a:spcBef>
+                <a:spcPct val="0"/>
+              </a:spcBef>
+              <a:buNone/>
+              <a:defRPr sz="6000" kern="1200">
+                <a:solidFill>
+                  <a:schemeClr val="tx1"/>
+                </a:solidFill>
+                <a:latin typeface="+mj-lt"/>
+                <a:ea typeface="+mj-ea"/>
+                <a:cs typeface="+mj-cs"/>
+              </a:defRPr>
+            </a:lvl1pPr>
+          </a:lstStyle>
+          <a:p>
+            <a:r>
+              <a:rPr lang="en-GB" sz="4400" b="1" dirty="0"/>
+              <a:t>Project 1</a:t>
             </a:r>
           </a:p>
         </p:txBody>
@@ -4597,8 +5897,8 @@
         </p:nvSpPr>
         <p:spPr>
           <a:xfrm>
-            <a:off x="361950" y="142875"/>
-            <a:ext cx="11934824" cy="5632311"/>
+            <a:off x="257176" y="1343602"/>
+            <a:ext cx="11934824" cy="4524315"/>
           </a:xfrm>
           <a:prstGeom prst="rect">
             <a:avLst/>
@@ -4610,22 +5910,6 @@
             <a:spAutoFit/>
           </a:bodyPr>
           <a:lstStyle/>
-          <a:p>
-            <a:r>
-              <a:rPr lang="en-GB" sz="3600" dirty="0">
-                <a:solidFill>
-                  <a:schemeClr val="bg1"/>
-                </a:solidFill>
-              </a:rPr>
-              <a:t>Research Questions</a:t>
-            </a:r>
-          </a:p>
-          <a:p>
-            <a:endParaRPr lang="en-GB" dirty="0"/>
-          </a:p>
-          <a:p>
-            <a:endParaRPr lang="en-GB" dirty="0"/>
-          </a:p>
           <a:p>
             <a:pPr marL="800100" lvl="1" indent="-342900">
               <a:buAutoNum type="arabicParenR"/>
@@ -4752,6 +6036,52 @@
                 </a:solidFill>
               </a:rPr>
               <a:t>Are some subjects easier to get a Grade 9 in than others?</a:t>
+            </a:r>
+          </a:p>
+        </p:txBody>
+      </p:sp>
+      <p:sp>
+        <p:nvSpPr>
+          <p:cNvPr id="5" name="Title 1">
+            <a:extLst>
+              <a:ext uri="{FF2B5EF4-FFF2-40B4-BE49-F238E27FC236}">
+                <a16:creationId xmlns:a16="http://schemas.microsoft.com/office/drawing/2014/main" id="{92D86ADA-C83D-4188-7EAD-8FC2624A9578}"/>
+              </a:ext>
+            </a:extLst>
+          </p:cNvPr>
+          <p:cNvSpPr>
+            <a:spLocks noGrp="1"/>
+          </p:cNvSpPr>
+          <p:nvPr>
+            <p:ph type="title"/>
+          </p:nvPr>
+        </p:nvSpPr>
+        <p:spPr>
+          <a:xfrm>
+            <a:off x="166254" y="195015"/>
+            <a:ext cx="11822545" cy="590076"/>
+          </a:xfrm>
+          <a:solidFill>
+            <a:schemeClr val="bg1">
+              <a:lumMod val="50000"/>
+            </a:schemeClr>
+          </a:solidFill>
+          <a:ln>
+            <a:solidFill>
+              <a:schemeClr val="bg1"/>
+            </a:solidFill>
+          </a:ln>
+        </p:spPr>
+        <p:txBody>
+          <a:bodyPr>
+            <a:normAutofit fontScale="90000"/>
+          </a:bodyPr>
+          <a:lstStyle/>
+          <a:p>
+            <a:pPr algn="ctr"/>
+            <a:r>
+              <a:rPr lang="en-GB" sz="4400" b="1" dirty="0"/>
+              <a:t>Research Questions</a:t>
             </a:r>
           </a:p>
         </p:txBody>
@@ -4800,7 +6130,7 @@
         </p:nvSpPr>
         <p:spPr>
           <a:xfrm>
-            <a:off x="400050" y="342900"/>
+            <a:off x="427759" y="1211119"/>
             <a:ext cx="10727552" cy="4247317"/>
           </a:xfrm>
           <a:prstGeom prst="rect">
@@ -4829,23 +6159,85 @@
           <a:p>
             <a:r>
               <a:rPr lang="en-GB" sz="2800" dirty="0">
-                <a:hlinkClick r:id="rId2"/>
+                <a:solidFill>
+                  <a:schemeClr val="bg1"/>
+                </a:solidFill>
+                <a:hlinkClick r:id="rId2">
+                  <a:extLst>
+                    <a:ext uri="{A12FA001-AC4F-418D-AE19-62706E023703}">
+                      <ahyp:hlinkClr xmlns:ahyp="http://schemas.microsoft.com/office/drawing/2018/hyperlinkcolor" val="tx"/>
+                    </a:ext>
+                  </a:extLst>
+                </a:hlinkClick>
               </a:rPr>
               <a:t>https://www.gov.uk/government/collections/statistics-gcses-key-stage-4</a:t>
             </a:r>
-            <a:endParaRPr lang="en-GB" sz="2800" dirty="0"/>
-          </a:p>
-          <a:p>
-            <a:endParaRPr lang="en-GB" sz="2800" dirty="0"/>
+            <a:endParaRPr lang="en-GB" sz="2800" dirty="0">
+              <a:solidFill>
+                <a:schemeClr val="bg1"/>
+              </a:solidFill>
+            </a:endParaRPr>
+          </a:p>
+          <a:p>
+            <a:endParaRPr lang="en-GB" sz="2800" dirty="0">
+              <a:solidFill>
+                <a:schemeClr val="bg1"/>
+              </a:solidFill>
+            </a:endParaRPr>
           </a:p>
           <a:p>
             <a:r>
               <a:rPr lang="en-GB" sz="2800" dirty="0">
-                <a:hlinkClick r:id="rId3" action="ppaction://hlinkfile"/>
+                <a:solidFill>
+                  <a:schemeClr val="bg1"/>
+                </a:solidFill>
+                <a:hlinkClick r:id="rId3" action="ppaction://hlinkfile">
+                  <a:extLst>
+                    <a:ext uri="{A12FA001-AC4F-418D-AE19-62706E023703}">
+                      <ahyp:hlinkClr xmlns:ahyp="http://schemas.microsoft.com/office/drawing/2018/hyperlinkcolor" val="tx"/>
+                    </a:ext>
+                  </a:extLst>
+                </a:hlinkClick>
               </a:rPr>
               <a:t>Data files</a:t>
             </a:r>
-            <a:endParaRPr lang="en-GB" sz="2800" dirty="0"/>
+            <a:endParaRPr lang="en-GB" sz="2800" dirty="0">
+              <a:solidFill>
+                <a:schemeClr val="bg1"/>
+              </a:solidFill>
+            </a:endParaRPr>
+          </a:p>
+          <a:p>
+            <a:r>
+              <a:rPr lang="en-GB" sz="2800" dirty="0">
+                <a:solidFill>
+                  <a:schemeClr val="bg1"/>
+                </a:solidFill>
+              </a:rPr>
+              <a:t>		</a:t>
+            </a:r>
+          </a:p>
+          <a:p>
+            <a:r>
+              <a:rPr lang="en-GB" sz="2800" dirty="0">
+                <a:solidFill>
+                  <a:schemeClr val="bg1"/>
+                </a:solidFill>
+                <a:hlinkClick r:id="rId4" action="ppaction://hlinkfile">
+                  <a:extLst>
+                    <a:ext uri="{A12FA001-AC4F-418D-AE19-62706E023703}">
+                      <ahyp:hlinkClr xmlns:ahyp="http://schemas.microsoft.com/office/drawing/2018/hyperlinkcolor" val="tx"/>
+                    </a:ext>
+                  </a:extLst>
+                </a:hlinkClick>
+              </a:rPr>
+              <a:t>Guidance</a:t>
+            </a:r>
+            <a:endParaRPr lang="en-GB" sz="2800" dirty="0">
+              <a:solidFill>
+                <a:schemeClr val="bg1"/>
+              </a:solidFill>
+            </a:endParaRPr>
           </a:p>
           <a:p>
             <a:r>
@@ -4854,25 +6246,74 @@
             </a:r>
           </a:p>
           <a:p>
-            <a:r>
-              <a:rPr lang="en-GB" sz="2800" dirty="0">
-                <a:hlinkClick r:id="rId4" action="ppaction://hlinkfile"/>
-              </a:rPr>
-              <a:t>Guidance</a:t>
-            </a:r>
             <a:endParaRPr lang="en-GB" sz="2800" dirty="0"/>
           </a:p>
           <a:p>
-            <a:r>
-              <a:rPr lang="en-GB" sz="2800" dirty="0"/>
-              <a:t>		</a:t>
-            </a:r>
-          </a:p>
-          <a:p>
-            <a:endParaRPr lang="en-GB" sz="2800" dirty="0"/>
-          </a:p>
-          <a:p>
             <a:endParaRPr lang="en-GB" dirty="0"/>
+          </a:p>
+        </p:txBody>
+      </p:sp>
+      <p:sp>
+        <p:nvSpPr>
+          <p:cNvPr id="2" name="Title 1">
+            <a:extLst>
+              <a:ext uri="{FF2B5EF4-FFF2-40B4-BE49-F238E27FC236}">
+                <a16:creationId xmlns:a16="http://schemas.microsoft.com/office/drawing/2014/main" id="{0101C4A9-3793-9901-922D-E67279AB5E0B}"/>
+              </a:ext>
+            </a:extLst>
+          </p:cNvPr>
+          <p:cNvSpPr txBox="1">
+            <a:spLocks/>
+          </p:cNvSpPr>
+          <p:nvPr/>
+        </p:nvSpPr>
+        <p:spPr>
+          <a:xfrm>
+            <a:off x="143164" y="130360"/>
+            <a:ext cx="11905672" cy="590076"/>
+          </a:xfrm>
+          <a:prstGeom prst="rect">
+            <a:avLst/>
+          </a:prstGeom>
+          <a:solidFill>
+            <a:schemeClr val="bg1">
+              <a:lumMod val="75000"/>
+            </a:schemeClr>
+          </a:solidFill>
+          <a:ln>
+            <a:solidFill>
+              <a:schemeClr val="bg1"/>
+            </a:solidFill>
+          </a:ln>
+        </p:spPr>
+        <p:txBody>
+          <a:bodyPr vert="horz" lIns="91440" tIns="45720" rIns="91440" bIns="45720" rtlCol="0" anchor="b">
+            <a:normAutofit fontScale="90000" lnSpcReduction="20000"/>
+          </a:bodyPr>
+          <a:lstStyle>
+            <a:lvl1pPr algn="ctr" defTabSz="914400" rtl="0" eaLnBrk="1" latinLnBrk="0" hangingPunct="1">
+              <a:lnSpc>
+                <a:spcPct val="90000"/>
+              </a:lnSpc>
+              <a:spcBef>
+                <a:spcPct val="0"/>
+              </a:spcBef>
+              <a:buNone/>
+              <a:defRPr sz="6000" kern="1200">
+                <a:solidFill>
+                  <a:schemeClr val="tx1"/>
+                </a:solidFill>
+                <a:latin typeface="+mj-lt"/>
+                <a:ea typeface="+mj-ea"/>
+                <a:cs typeface="+mj-cs"/>
+              </a:defRPr>
+            </a:lvl1pPr>
+          </a:lstStyle>
+          <a:p>
+            <a:r>
+              <a:rPr lang="en-GB" sz="4400" b="1" dirty="0"/>
+              <a:t>Data Source</a:t>
+            </a:r>
           </a:p>
         </p:txBody>
       </p:sp>
@@ -4989,7 +6430,7 @@
         </p:nvSpPr>
         <p:spPr>
           <a:xfrm>
-            <a:off x="303796" y="370727"/>
+            <a:off x="285323" y="1275891"/>
             <a:ext cx="11258551" cy="2893421"/>
           </a:xfrm>
           <a:prstGeom prst="rect">
@@ -5167,6 +6608,70 @@
               <a:ea typeface="Calibri" panose="020F0502020204030204" pitchFamily="34" charset="0"/>
               <a:cs typeface="Times New Roman" panose="02020603050405020304" pitchFamily="18" charset="0"/>
             </a:endParaRPr>
+          </a:p>
+        </p:txBody>
+      </p:sp>
+      <p:sp>
+        <p:nvSpPr>
+          <p:cNvPr id="2" name="Title 1">
+            <a:extLst>
+              <a:ext uri="{FF2B5EF4-FFF2-40B4-BE49-F238E27FC236}">
+                <a16:creationId xmlns:a16="http://schemas.microsoft.com/office/drawing/2014/main" id="{5503E7C6-C47A-5C68-55D8-408B01C0513B}"/>
+              </a:ext>
+            </a:extLst>
+          </p:cNvPr>
+          <p:cNvSpPr txBox="1">
+            <a:spLocks/>
+          </p:cNvSpPr>
+          <p:nvPr/>
+        </p:nvSpPr>
+        <p:spPr>
+          <a:xfrm>
+            <a:off x="184727" y="195015"/>
+            <a:ext cx="11841018" cy="590076"/>
+          </a:xfrm>
+          <a:prstGeom prst="rect">
+            <a:avLst/>
+          </a:prstGeom>
+          <a:solidFill>
+            <a:schemeClr val="bg1">
+              <a:lumMod val="50000"/>
+            </a:schemeClr>
+          </a:solidFill>
+          <a:ln>
+            <a:solidFill>
+              <a:schemeClr val="bg1"/>
+            </a:solidFill>
+          </a:ln>
+        </p:spPr>
+        <p:txBody>
+          <a:bodyPr vert="horz" lIns="91440" tIns="45720" rIns="91440" bIns="45720" rtlCol="0" anchor="b">
+            <a:normAutofit fontScale="90000" lnSpcReduction="20000"/>
+          </a:bodyPr>
+          <a:lstStyle>
+            <a:lvl1pPr algn="ctr" defTabSz="914400" rtl="0" eaLnBrk="1" latinLnBrk="0" hangingPunct="1">
+              <a:lnSpc>
+                <a:spcPct val="90000"/>
+              </a:lnSpc>
+              <a:spcBef>
+                <a:spcPct val="0"/>
+              </a:spcBef>
+              <a:buNone/>
+              <a:defRPr sz="6000" kern="1200">
+                <a:solidFill>
+                  <a:schemeClr val="tx1"/>
+                </a:solidFill>
+                <a:latin typeface="+mj-lt"/>
+                <a:ea typeface="+mj-ea"/>
+                <a:cs typeface="+mj-cs"/>
+              </a:defRPr>
+            </a:lvl1pPr>
+          </a:lstStyle>
+          <a:p>
+            <a:r>
+              <a:rPr lang="en-GB" sz="4400" b="1" dirty="0"/>
+              <a:t>Measures of Success in Education</a:t>
+            </a:r>
           </a:p>
         </p:txBody>
       </p:sp>
@@ -5214,8 +6719,8 @@
         </p:nvSpPr>
         <p:spPr>
           <a:xfrm>
-            <a:off x="312938" y="274286"/>
-            <a:ext cx="11174768" cy="4924425"/>
+            <a:off x="312938" y="1133268"/>
+            <a:ext cx="11174768" cy="4216539"/>
           </a:xfrm>
           <a:prstGeom prst="rect">
             <a:avLst/>
@@ -5227,30 +6732,6 @@
             <a:spAutoFit/>
           </a:bodyPr>
           <a:lstStyle/>
-          <a:p>
-            <a:r>
-              <a:rPr lang="en-GB" sz="2800" kern="100" dirty="0">
-                <a:solidFill>
-                  <a:schemeClr val="bg1"/>
-                </a:solidFill>
-                <a:effectLst/>
-                <a:latin typeface="Calibri" panose="020F0502020204030204" pitchFamily="34" charset="0"/>
-                <a:ea typeface="Calibri" panose="020F0502020204030204" pitchFamily="34" charset="0"/>
-                <a:cs typeface="Times New Roman" panose="02020603050405020304" pitchFamily="18" charset="0"/>
-              </a:rPr>
-              <a:t>Buckets</a:t>
-            </a:r>
-          </a:p>
-          <a:p>
-            <a:endParaRPr lang="en-GB" kern="100" dirty="0">
-              <a:solidFill>
-                <a:schemeClr val="bg1"/>
-              </a:solidFill>
-              <a:latin typeface="Calibri" panose="020F0502020204030204" pitchFamily="34" charset="0"/>
-              <a:ea typeface="Calibri" panose="020F0502020204030204" pitchFamily="34" charset="0"/>
-              <a:cs typeface="Times New Roman" panose="02020603050405020304" pitchFamily="18" charset="0"/>
-            </a:endParaRPr>
-          </a:p>
           <a:p>
             <a:r>
               <a:rPr lang="en-GB" sz="2000" kern="100" dirty="0">
@@ -5549,6 +7030,70 @@
           </a:p>
           <a:p>
             <a:endParaRPr lang="en-GB" dirty="0"/>
+          </a:p>
+        </p:txBody>
+      </p:sp>
+      <p:sp>
+        <p:nvSpPr>
+          <p:cNvPr id="2" name="Title 1">
+            <a:extLst>
+              <a:ext uri="{FF2B5EF4-FFF2-40B4-BE49-F238E27FC236}">
+                <a16:creationId xmlns:a16="http://schemas.microsoft.com/office/drawing/2014/main" id="{A8262789-F15B-F071-7C90-9F4E6F561643}"/>
+              </a:ext>
+            </a:extLst>
+          </p:cNvPr>
+          <p:cNvSpPr txBox="1">
+            <a:spLocks/>
+          </p:cNvSpPr>
+          <p:nvPr/>
+        </p:nvSpPr>
+        <p:spPr>
+          <a:xfrm>
+            <a:off x="240144" y="195015"/>
+            <a:ext cx="11748655" cy="590076"/>
+          </a:xfrm>
+          <a:prstGeom prst="rect">
+            <a:avLst/>
+          </a:prstGeom>
+          <a:solidFill>
+            <a:schemeClr val="bg1">
+              <a:lumMod val="50000"/>
+            </a:schemeClr>
+          </a:solidFill>
+          <a:ln>
+            <a:solidFill>
+              <a:schemeClr val="bg1"/>
+            </a:solidFill>
+          </a:ln>
+        </p:spPr>
+        <p:txBody>
+          <a:bodyPr vert="horz" lIns="91440" tIns="45720" rIns="91440" bIns="45720" rtlCol="0" anchor="b">
+            <a:normAutofit fontScale="90000" lnSpcReduction="20000"/>
+          </a:bodyPr>
+          <a:lstStyle>
+            <a:lvl1pPr algn="ctr" defTabSz="914400" rtl="0" eaLnBrk="1" latinLnBrk="0" hangingPunct="1">
+              <a:lnSpc>
+                <a:spcPct val="90000"/>
+              </a:lnSpc>
+              <a:spcBef>
+                <a:spcPct val="0"/>
+              </a:spcBef>
+              <a:buNone/>
+              <a:defRPr sz="6000" kern="1200">
+                <a:solidFill>
+                  <a:schemeClr val="tx1"/>
+                </a:solidFill>
+                <a:latin typeface="+mj-lt"/>
+                <a:ea typeface="+mj-ea"/>
+                <a:cs typeface="+mj-cs"/>
+              </a:defRPr>
+            </a:lvl1pPr>
+          </a:lstStyle>
+          <a:p>
+            <a:r>
+              <a:rPr lang="en-GB" sz="4400" b="1" dirty="0"/>
+              <a:t>Buckets for Subjects</a:t>
+            </a:r>
           </a:p>
         </p:txBody>
       </p:sp>
@@ -5604,8 +7149,8 @@
         </p:blipFill>
         <p:spPr>
           <a:xfrm>
-            <a:off x="702305" y="963590"/>
-            <a:ext cx="5393695" cy="3029650"/>
+            <a:off x="609307" y="1348585"/>
+            <a:ext cx="4664606" cy="2620119"/>
           </a:xfrm>
           <a:prstGeom prst="rect">
             <a:avLst/>
@@ -5626,7 +7171,7 @@
         </p:nvSpPr>
         <p:spPr>
           <a:xfrm>
-            <a:off x="193964" y="193964"/>
+            <a:off x="203200" y="675989"/>
             <a:ext cx="8294002" cy="523220"/>
           </a:xfrm>
           <a:prstGeom prst="rect">
@@ -5673,7 +7218,7 @@
         </p:blipFill>
         <p:spPr>
           <a:xfrm>
-            <a:off x="609307" y="4174835"/>
+            <a:off x="609307" y="4145227"/>
             <a:ext cx="9097925" cy="2318328"/>
           </a:xfrm>
           <a:prstGeom prst="rect">
@@ -5799,7 +7344,7 @@
         </p:nvSpPr>
         <p:spPr>
           <a:xfrm>
-            <a:off x="6650182" y="898779"/>
+            <a:off x="6289964" y="1822142"/>
             <a:ext cx="3140363" cy="1077218"/>
           </a:xfrm>
           <a:prstGeom prst="rect">
@@ -5820,6 +7365,82 @@
                 </a:solidFill>
               </a:rPr>
               <a:t>GCSEs are graded from 1 to 9</a:t>
+            </a:r>
+          </a:p>
+        </p:txBody>
+      </p:sp>
+      <p:sp>
+        <p:nvSpPr>
+          <p:cNvPr id="3" name="Title 1">
+            <a:extLst>
+              <a:ext uri="{FF2B5EF4-FFF2-40B4-BE49-F238E27FC236}">
+                <a16:creationId xmlns:a16="http://schemas.microsoft.com/office/drawing/2014/main" id="{B8965BE0-FA75-D027-DE78-D0A52BAB6F28}"/>
+              </a:ext>
+            </a:extLst>
+          </p:cNvPr>
+          <p:cNvSpPr txBox="1">
+            <a:spLocks/>
+          </p:cNvSpPr>
+          <p:nvPr/>
+        </p:nvSpPr>
+        <p:spPr>
+          <a:xfrm>
+            <a:off x="101601" y="85913"/>
+            <a:ext cx="11961090" cy="590076"/>
+          </a:xfrm>
+          <a:prstGeom prst="rect">
+            <a:avLst/>
+          </a:prstGeom>
+          <a:solidFill>
+            <a:schemeClr val="bg1">
+              <a:lumMod val="50000"/>
+            </a:schemeClr>
+          </a:solidFill>
+          <a:ln>
+            <a:solidFill>
+              <a:schemeClr val="bg1"/>
+            </a:solidFill>
+          </a:ln>
+        </p:spPr>
+        <p:txBody>
+          <a:bodyPr vert="horz" lIns="91440" tIns="45720" rIns="91440" bIns="45720" rtlCol="0" anchor="b">
+            <a:normAutofit fontScale="90000" lnSpcReduction="20000"/>
+          </a:bodyPr>
+          <a:lstStyle>
+            <a:lvl1pPr algn="ctr" defTabSz="914400" rtl="0" eaLnBrk="1" latinLnBrk="0" hangingPunct="1">
+              <a:lnSpc>
+                <a:spcPct val="90000"/>
+              </a:lnSpc>
+              <a:spcBef>
+                <a:spcPct val="0"/>
+              </a:spcBef>
+              <a:buNone/>
+              <a:defRPr sz="6000" kern="1200">
+                <a:solidFill>
+                  <a:schemeClr val="tx1"/>
+                </a:solidFill>
+                <a:latin typeface="+mj-lt"/>
+                <a:ea typeface="+mj-ea"/>
+                <a:cs typeface="+mj-cs"/>
+              </a:defRPr>
+            </a:lvl1pPr>
+          </a:lstStyle>
+          <a:p>
+            <a:r>
+              <a:rPr lang="en-GB" sz="4400" b="1" dirty="0"/>
+              <a:t>An</a:t>
+            </a:r>
+            <a:r>
+              <a:rPr lang="en-GB" sz="4400" b="1" dirty="0">
+                <a:solidFill>
+                  <a:schemeClr val="bg1"/>
+                </a:solidFill>
+              </a:rPr>
+              <a:t> </a:t>
+            </a:r>
+            <a:r>
+              <a:rPr lang="en-GB" sz="4400" b="1" dirty="0"/>
+              <a:t>Example</a:t>
             </a:r>
           </a:p>
         </p:txBody>

</xml_diff>